<commit_message>
11-07-2024 spring  core done
</commit_message>
<xml_diff>
--- a/2_spring and spring boot.pptx
+++ b/2_spring and spring boot.pptx
@@ -13,6 +13,11 @@
     <p:sldId id="261" r:id="rId7"/>
     <p:sldId id="262" r:id="rId8"/>
     <p:sldId id="263" r:id="rId9"/>
+    <p:sldId id="266" r:id="rId10"/>
+    <p:sldId id="264" r:id="rId11"/>
+    <p:sldId id="265" r:id="rId12"/>
+    <p:sldId id="267" r:id="rId13"/>
+    <p:sldId id="268" r:id="rId14"/>
   </p:sldIdLst>
   <p:sldSz cx="12192000" cy="6858000"/>
   <p:notesSz cx="6858000" cy="9144000"/>
@@ -111,6 +116,11 @@
       </a:defRPr>
     </a:lvl9pPr>
   </p:defaultTextStyle>
+  <p:extLst>
+    <p:ext uri="{EFAFB233-063F-42B5-8137-9DF3F51BA10A}">
+      <p15:sldGuideLst xmlns:p15="http://schemas.microsoft.com/office/powerpoint/2012/main"/>
+    </p:ext>
+  </p:extLst>
 </p:presentation>
 </file>
 
@@ -263,7 +273,7 @@
           <a:p>
             <a:fld id="{C4F0DE68-8E05-A345-866E-F8C1D50CC097}" type="datetimeFigureOut">
               <a:rPr lang="en-US" smtClean="0"/>
-              <a:t>7/9/24</a:t>
+              <a:t>7/11/24</a:t>
             </a:fld>
             <a:endParaRPr lang="en-US"/>
           </a:p>
@@ -463,7 +473,7 @@
           <a:p>
             <a:fld id="{C4F0DE68-8E05-A345-866E-F8C1D50CC097}" type="datetimeFigureOut">
               <a:rPr lang="en-US" smtClean="0"/>
-              <a:t>7/9/24</a:t>
+              <a:t>7/11/24</a:t>
             </a:fld>
             <a:endParaRPr lang="en-US"/>
           </a:p>
@@ -673,7 +683,7 @@
           <a:p>
             <a:fld id="{C4F0DE68-8E05-A345-866E-F8C1D50CC097}" type="datetimeFigureOut">
               <a:rPr lang="en-US" smtClean="0"/>
-              <a:t>7/9/24</a:t>
+              <a:t>7/11/24</a:t>
             </a:fld>
             <a:endParaRPr lang="en-US"/>
           </a:p>
@@ -873,7 +883,7 @@
           <a:p>
             <a:fld id="{C4F0DE68-8E05-A345-866E-F8C1D50CC097}" type="datetimeFigureOut">
               <a:rPr lang="en-US" smtClean="0"/>
-              <a:t>7/9/24</a:t>
+              <a:t>7/11/24</a:t>
             </a:fld>
             <a:endParaRPr lang="en-US"/>
           </a:p>
@@ -1149,7 +1159,7 @@
           <a:p>
             <a:fld id="{C4F0DE68-8E05-A345-866E-F8C1D50CC097}" type="datetimeFigureOut">
               <a:rPr lang="en-US" smtClean="0"/>
-              <a:t>7/9/24</a:t>
+              <a:t>7/11/24</a:t>
             </a:fld>
             <a:endParaRPr lang="en-US"/>
           </a:p>
@@ -1417,7 +1427,7 @@
           <a:p>
             <a:fld id="{C4F0DE68-8E05-A345-866E-F8C1D50CC097}" type="datetimeFigureOut">
               <a:rPr lang="en-US" smtClean="0"/>
-              <a:t>7/9/24</a:t>
+              <a:t>7/11/24</a:t>
             </a:fld>
             <a:endParaRPr lang="en-US"/>
           </a:p>
@@ -1832,7 +1842,7 @@
           <a:p>
             <a:fld id="{C4F0DE68-8E05-A345-866E-F8C1D50CC097}" type="datetimeFigureOut">
               <a:rPr lang="en-US" smtClean="0"/>
-              <a:t>7/9/24</a:t>
+              <a:t>7/11/24</a:t>
             </a:fld>
             <a:endParaRPr lang="en-US"/>
           </a:p>
@@ -1974,7 +1984,7 @@
           <a:p>
             <a:fld id="{C4F0DE68-8E05-A345-866E-F8C1D50CC097}" type="datetimeFigureOut">
               <a:rPr lang="en-US" smtClean="0"/>
-              <a:t>7/9/24</a:t>
+              <a:t>7/11/24</a:t>
             </a:fld>
             <a:endParaRPr lang="en-US"/>
           </a:p>
@@ -2087,7 +2097,7 @@
           <a:p>
             <a:fld id="{C4F0DE68-8E05-A345-866E-F8C1D50CC097}" type="datetimeFigureOut">
               <a:rPr lang="en-US" smtClean="0"/>
-              <a:t>7/9/24</a:t>
+              <a:t>7/11/24</a:t>
             </a:fld>
             <a:endParaRPr lang="en-US"/>
           </a:p>
@@ -2400,7 +2410,7 @@
           <a:p>
             <a:fld id="{C4F0DE68-8E05-A345-866E-F8C1D50CC097}" type="datetimeFigureOut">
               <a:rPr lang="en-US" smtClean="0"/>
-              <a:t>7/9/24</a:t>
+              <a:t>7/11/24</a:t>
             </a:fld>
             <a:endParaRPr lang="en-US"/>
           </a:p>
@@ -2689,7 +2699,7 @@
           <a:p>
             <a:fld id="{C4F0DE68-8E05-A345-866E-F8C1D50CC097}" type="datetimeFigureOut">
               <a:rPr lang="en-US" smtClean="0"/>
-              <a:t>7/9/24</a:t>
+              <a:t>7/11/24</a:t>
             </a:fld>
             <a:endParaRPr lang="en-US"/>
           </a:p>
@@ -2932,7 +2942,7 @@
           <a:p>
             <a:fld id="{C4F0DE68-8E05-A345-866E-F8C1D50CC097}" type="datetimeFigureOut">
               <a:rPr lang="en-US" smtClean="0"/>
-              <a:t>7/9/24</a:t>
+              <a:t>7/11/24</a:t>
             </a:fld>
             <a:endParaRPr lang="en-US"/>
           </a:p>
@@ -3444,6 +3454,1896 @@
   <p:clrMapOvr>
     <a:masterClrMapping/>
   </p:clrMapOvr>
+  <mc:AlternateContent xmlns:mc="http://schemas.openxmlformats.org/markup-compatibility/2006" xmlns:p14="http://schemas.microsoft.com/office/powerpoint/2010/main">
+    <mc:Choice Requires="p14">
+      <p:transition spd="med" p14:dur="700">
+        <p:fade/>
+      </p:transition>
+    </mc:Choice>
+    <mc:Fallback xmlns="">
+      <p:transition spd="med">
+        <p:fade/>
+      </p:transition>
+    </mc:Fallback>
+  </mc:AlternateContent>
+</p:sld>
+</file>
+
+<file path=ppt/slides/slide10.xml><?xml version="1.0" encoding="utf-8"?>
+<p:sld xmlns:a="http://schemas.openxmlformats.org/drawingml/2006/main" xmlns:r="http://schemas.openxmlformats.org/officeDocument/2006/relationships" xmlns:p="http://schemas.openxmlformats.org/presentationml/2006/main">
+  <p:cSld>
+    <p:bg>
+      <p:bgPr>
+        <a:blipFill dpi="0" rotWithShape="1">
+          <a:blip r:embed="rId2">
+            <a:lum/>
+          </a:blip>
+          <a:srcRect/>
+          <a:stretch>
+            <a:fillRect/>
+          </a:stretch>
+        </a:blipFill>
+        <a:effectLst/>
+      </p:bgPr>
+    </p:bg>
+    <p:spTree>
+      <p:nvGrpSpPr>
+        <p:cNvPr id="1" name=""/>
+        <p:cNvGrpSpPr/>
+        <p:nvPr/>
+      </p:nvGrpSpPr>
+      <p:grpSpPr>
+        <a:xfrm>
+          <a:off x="0" y="0"/>
+          <a:ext cx="0" cy="0"/>
+          <a:chOff x="0" y="0"/>
+          <a:chExt cx="0" cy="0"/>
+        </a:xfrm>
+      </p:grpSpPr>
+      <p:sp>
+        <p:nvSpPr>
+          <p:cNvPr id="2" name="Rectangle 1">
+            <a:extLst>
+              <a:ext uri="{FF2B5EF4-FFF2-40B4-BE49-F238E27FC236}">
+                <a16:creationId xmlns:a16="http://schemas.microsoft.com/office/drawing/2014/main" id="{48F9CE81-C1F0-B68D-8064-60FA8458DF94}"/>
+              </a:ext>
+            </a:extLst>
+          </p:cNvPr>
+          <p:cNvSpPr/>
+          <p:nvPr/>
+        </p:nvSpPr>
+        <p:spPr>
+          <a:xfrm>
+            <a:off x="906195" y="469579"/>
+            <a:ext cx="4012638" cy="923330"/>
+          </a:xfrm>
+          <a:prstGeom prst="rect">
+            <a:avLst/>
+          </a:prstGeom>
+          <a:noFill/>
+        </p:spPr>
+        <p:txBody>
+          <a:bodyPr wrap="none" lIns="91440" tIns="45720" rIns="91440" bIns="45720">
+            <a:spAutoFit/>
+            <a:scene3d>
+              <a:camera prst="orthographicFront"/>
+              <a:lightRig rig="soft" dir="t">
+                <a:rot lat="0" lon="0" rev="15600000"/>
+              </a:lightRig>
+            </a:scene3d>
+            <a:sp3d extrusionH="57150" prstMaterial="softEdge">
+              <a:bevelT w="25400" h="38100"/>
+            </a:sp3d>
+          </a:bodyPr>
+          <a:lstStyle/>
+          <a:p>
+            <a:pPr algn="ctr"/>
+            <a:r>
+              <a:rPr lang="en-GB" sz="5400" dirty="0">
+                <a:ln w="0"/>
+                <a:gradFill>
+                  <a:gsLst>
+                    <a:gs pos="0">
+                      <a:schemeClr val="accent5">
+                        <a:lumMod val="50000"/>
+                      </a:schemeClr>
+                    </a:gs>
+                    <a:gs pos="50000">
+                      <a:schemeClr val="accent5"/>
+                    </a:gs>
+                    <a:gs pos="100000">
+                      <a:schemeClr val="accent5">
+                        <a:lumMod val="60000"/>
+                        <a:lumOff val="40000"/>
+                      </a:schemeClr>
+                    </a:gs>
+                  </a:gsLst>
+                  <a:lin ang="5400000"/>
+                </a:gradFill>
+                <a:effectLst>
+                  <a:reflection blurRad="6350" stA="53000" endA="300" endPos="35500" dir="5400000" sy="-90000" algn="bl" rotWithShape="0"/>
+                </a:effectLst>
+                <a:latin typeface="Times New Roman" panose="02020603050405020304" pitchFamily="18" charset="0"/>
+                <a:cs typeface="Times New Roman" panose="02020603050405020304" pitchFamily="18" charset="0"/>
+              </a:rPr>
+              <a:t>Beans Scopes</a:t>
+            </a:r>
+          </a:p>
+        </p:txBody>
+      </p:sp>
+      <p:sp>
+        <p:nvSpPr>
+          <p:cNvPr id="3" name="TextBox 2">
+            <a:extLst>
+              <a:ext uri="{FF2B5EF4-FFF2-40B4-BE49-F238E27FC236}">
+                <a16:creationId xmlns:a16="http://schemas.microsoft.com/office/drawing/2014/main" id="{E634EB09-B96B-3B94-C9B4-780CAFDCDF1C}"/>
+              </a:ext>
+            </a:extLst>
+          </p:cNvPr>
+          <p:cNvSpPr txBox="1"/>
+          <p:nvPr/>
+        </p:nvSpPr>
+        <p:spPr>
+          <a:xfrm>
+            <a:off x="906195" y="1489961"/>
+            <a:ext cx="9134763" cy="5028556"/>
+          </a:xfrm>
+          <a:prstGeom prst="rect">
+            <a:avLst/>
+          </a:prstGeom>
+          <a:noFill/>
+        </p:spPr>
+        <p:txBody>
+          <a:bodyPr wrap="square" rtlCol="0">
+            <a:spAutoFit/>
+          </a:bodyPr>
+          <a:lstStyle/>
+          <a:p>
+            <a:pPr marL="285750" indent="-285750">
+              <a:lnSpc>
+                <a:spcPct val="150000"/>
+              </a:lnSpc>
+              <a:buFont typeface="Wingdings" pitchFamily="2" charset="2"/>
+              <a:buChar char="ü"/>
+            </a:pPr>
+            <a:r>
+              <a:rPr lang="en-US" b="1" dirty="0">
+                <a:latin typeface="Times New Roman" panose="02020603050405020304" pitchFamily="18" charset="0"/>
+                <a:cs typeface="Times New Roman" panose="02020603050405020304" pitchFamily="18" charset="0"/>
+              </a:rPr>
+              <a:t>Singleton: </a:t>
+            </a:r>
+            <a:r>
+              <a:rPr lang="en-US" dirty="0">
+                <a:latin typeface="Times New Roman" panose="02020603050405020304" pitchFamily="18" charset="0"/>
+                <a:cs typeface="Times New Roman" panose="02020603050405020304" pitchFamily="18" charset="0"/>
+              </a:rPr>
+              <a:t>Default) Scopes a single bean definition to a single object instance for each Spring IoC container</a:t>
+            </a:r>
+          </a:p>
+          <a:p>
+            <a:pPr marL="285750" indent="-285750">
+              <a:lnSpc>
+                <a:spcPct val="150000"/>
+              </a:lnSpc>
+              <a:buFont typeface="Wingdings" pitchFamily="2" charset="2"/>
+              <a:buChar char="ü"/>
+            </a:pPr>
+            <a:r>
+              <a:rPr lang="en-US" b="1" dirty="0">
+                <a:latin typeface="Times New Roman" panose="02020603050405020304" pitchFamily="18" charset="0"/>
+                <a:cs typeface="Times New Roman" panose="02020603050405020304" pitchFamily="18" charset="0"/>
+              </a:rPr>
+              <a:t>Prototype: </a:t>
+            </a:r>
+            <a:r>
+              <a:rPr lang="en-US" dirty="0">
+                <a:latin typeface="Times New Roman" panose="02020603050405020304" pitchFamily="18" charset="0"/>
+                <a:cs typeface="Times New Roman" panose="02020603050405020304" pitchFamily="18" charset="0"/>
+              </a:rPr>
+              <a:t>Scopes a single bean definition to any number of object instances.</a:t>
+            </a:r>
+          </a:p>
+          <a:p>
+            <a:pPr marL="285750" indent="-285750">
+              <a:lnSpc>
+                <a:spcPct val="150000"/>
+              </a:lnSpc>
+              <a:buFont typeface="Wingdings" pitchFamily="2" charset="2"/>
+              <a:buChar char="ü"/>
+            </a:pPr>
+            <a:r>
+              <a:rPr lang="en-US" b="1" dirty="0">
+                <a:latin typeface="Times New Roman" panose="02020603050405020304" pitchFamily="18" charset="0"/>
+                <a:cs typeface="Times New Roman" panose="02020603050405020304" pitchFamily="18" charset="0"/>
+              </a:rPr>
+              <a:t>Request: </a:t>
+            </a:r>
+            <a:r>
+              <a:rPr lang="en-US" dirty="0">
+                <a:latin typeface="Times New Roman" panose="02020603050405020304" pitchFamily="18" charset="0"/>
+                <a:cs typeface="Times New Roman" panose="02020603050405020304" pitchFamily="18" charset="0"/>
+              </a:rPr>
+              <a:t>Scopes a single bean definition to the lifecycle of a single HTTP request</a:t>
+            </a:r>
+            <a:r>
+              <a:rPr lang="en-US" b="1" dirty="0">
+                <a:latin typeface="Times New Roman" panose="02020603050405020304" pitchFamily="18" charset="0"/>
+                <a:cs typeface="Times New Roman" panose="02020603050405020304" pitchFamily="18" charset="0"/>
+              </a:rPr>
+              <a:t>. </a:t>
+            </a:r>
+            <a:r>
+              <a:rPr lang="en-US" dirty="0">
+                <a:latin typeface="Times New Roman" panose="02020603050405020304" pitchFamily="18" charset="0"/>
+                <a:cs typeface="Times New Roman" panose="02020603050405020304" pitchFamily="18" charset="0"/>
+              </a:rPr>
+              <a:t>That is, each HTTP request has its own instance of a bean created off the back of a single bean definition. Only valid in the context of a web-aware Spring </a:t>
+            </a:r>
+            <a:r>
+              <a:rPr lang="en-US" dirty="0" err="1">
+                <a:latin typeface="Times New Roman" panose="02020603050405020304" pitchFamily="18" charset="0"/>
+                <a:cs typeface="Times New Roman" panose="02020603050405020304" pitchFamily="18" charset="0"/>
+              </a:rPr>
+              <a:t>ApplicationContext</a:t>
+            </a:r>
+            <a:r>
+              <a:rPr lang="en-US" dirty="0">
+                <a:latin typeface="Times New Roman" panose="02020603050405020304" pitchFamily="18" charset="0"/>
+                <a:cs typeface="Times New Roman" panose="02020603050405020304" pitchFamily="18" charset="0"/>
+              </a:rPr>
+              <a:t>.</a:t>
+            </a:r>
+          </a:p>
+          <a:p>
+            <a:pPr marL="285750" indent="-285750">
+              <a:lnSpc>
+                <a:spcPct val="150000"/>
+              </a:lnSpc>
+              <a:buFont typeface="Wingdings" pitchFamily="2" charset="2"/>
+              <a:buChar char="ü"/>
+            </a:pPr>
+            <a:r>
+              <a:rPr lang="en-US" b="1" dirty="0">
+                <a:latin typeface="Times New Roman" panose="02020603050405020304" pitchFamily="18" charset="0"/>
+                <a:cs typeface="Times New Roman" panose="02020603050405020304" pitchFamily="18" charset="0"/>
+              </a:rPr>
+              <a:t>Session: </a:t>
+            </a:r>
+            <a:r>
+              <a:rPr lang="en-US" dirty="0">
+                <a:latin typeface="Times New Roman" panose="02020603050405020304" pitchFamily="18" charset="0"/>
+                <a:cs typeface="Times New Roman" panose="02020603050405020304" pitchFamily="18" charset="0"/>
+              </a:rPr>
+              <a:t>Scopes a single bean definition to the lifecycle of an HTTP Session. Only valid in the context of a web-aware Spring </a:t>
+            </a:r>
+            <a:r>
+              <a:rPr lang="en-US" dirty="0" err="1">
+                <a:latin typeface="Times New Roman" panose="02020603050405020304" pitchFamily="18" charset="0"/>
+                <a:cs typeface="Times New Roman" panose="02020603050405020304" pitchFamily="18" charset="0"/>
+              </a:rPr>
+              <a:t>ApplicationContext</a:t>
+            </a:r>
+            <a:r>
+              <a:rPr lang="en-US" dirty="0">
+                <a:latin typeface="Times New Roman" panose="02020603050405020304" pitchFamily="18" charset="0"/>
+                <a:cs typeface="Times New Roman" panose="02020603050405020304" pitchFamily="18" charset="0"/>
+              </a:rPr>
+              <a:t>.</a:t>
+            </a:r>
+          </a:p>
+          <a:p>
+            <a:pPr marL="285750" indent="-285750">
+              <a:lnSpc>
+                <a:spcPct val="150000"/>
+              </a:lnSpc>
+              <a:buFont typeface="Wingdings" pitchFamily="2" charset="2"/>
+              <a:buChar char="ü"/>
+            </a:pPr>
+            <a:r>
+              <a:rPr lang="en-US" b="1" dirty="0">
+                <a:latin typeface="Times New Roman" panose="02020603050405020304" pitchFamily="18" charset="0"/>
+                <a:cs typeface="Times New Roman" panose="02020603050405020304" pitchFamily="18" charset="0"/>
+              </a:rPr>
+              <a:t>Application</a:t>
+            </a:r>
+            <a:r>
+              <a:rPr lang="en-US" dirty="0">
+                <a:latin typeface="Times New Roman" panose="02020603050405020304" pitchFamily="18" charset="0"/>
+                <a:cs typeface="Times New Roman" panose="02020603050405020304" pitchFamily="18" charset="0"/>
+              </a:rPr>
+              <a:t>: Scopes a single bean definition to the lifecycle of a </a:t>
+            </a:r>
+            <a:r>
+              <a:rPr lang="en-US" dirty="0" err="1">
+                <a:latin typeface="Times New Roman" panose="02020603050405020304" pitchFamily="18" charset="0"/>
+                <a:cs typeface="Times New Roman" panose="02020603050405020304" pitchFamily="18" charset="0"/>
+              </a:rPr>
+              <a:t>ServletContext</a:t>
+            </a:r>
+            <a:r>
+              <a:rPr lang="en-US" dirty="0">
+                <a:latin typeface="Times New Roman" panose="02020603050405020304" pitchFamily="18" charset="0"/>
+                <a:cs typeface="Times New Roman" panose="02020603050405020304" pitchFamily="18" charset="0"/>
+              </a:rPr>
+              <a:t>. Only valid in the context of a web-aware </a:t>
+            </a:r>
+            <a:r>
+              <a:rPr lang="en-US" dirty="0" err="1">
+                <a:latin typeface="Times New Roman" panose="02020603050405020304" pitchFamily="18" charset="0"/>
+                <a:cs typeface="Times New Roman" panose="02020603050405020304" pitchFamily="18" charset="0"/>
+              </a:rPr>
+              <a:t>Spriang</a:t>
+            </a:r>
+            <a:r>
+              <a:rPr lang="en-US" dirty="0">
+                <a:latin typeface="Times New Roman" panose="02020603050405020304" pitchFamily="18" charset="0"/>
+                <a:cs typeface="Times New Roman" panose="02020603050405020304" pitchFamily="18" charset="0"/>
+              </a:rPr>
+              <a:t> </a:t>
+            </a:r>
+            <a:r>
+              <a:rPr lang="en-US" dirty="0" err="1">
+                <a:latin typeface="Times New Roman" panose="02020603050405020304" pitchFamily="18" charset="0"/>
+                <a:cs typeface="Times New Roman" panose="02020603050405020304" pitchFamily="18" charset="0"/>
+              </a:rPr>
+              <a:t>ApplicationContext</a:t>
+            </a:r>
+            <a:r>
+              <a:rPr lang="en-US" dirty="0">
+                <a:latin typeface="Times New Roman" panose="02020603050405020304" pitchFamily="18" charset="0"/>
+                <a:cs typeface="Times New Roman" panose="02020603050405020304" pitchFamily="18" charset="0"/>
+              </a:rPr>
+              <a:t>.</a:t>
+            </a:r>
+          </a:p>
+          <a:p>
+            <a:pPr marL="285750" indent="-285750">
+              <a:lnSpc>
+                <a:spcPct val="150000"/>
+              </a:lnSpc>
+              <a:buFont typeface="Wingdings" pitchFamily="2" charset="2"/>
+              <a:buChar char="ü"/>
+            </a:pPr>
+            <a:r>
+              <a:rPr lang="en-US" b="1" dirty="0" err="1">
+                <a:latin typeface="Times New Roman" panose="02020603050405020304" pitchFamily="18" charset="0"/>
+                <a:cs typeface="Times New Roman" panose="02020603050405020304" pitchFamily="18" charset="0"/>
+              </a:rPr>
+              <a:t>Websocket:</a:t>
+            </a:r>
+            <a:r>
+              <a:rPr lang="en-US" dirty="0" err="1">
+                <a:latin typeface="Times New Roman" panose="02020603050405020304" pitchFamily="18" charset="0"/>
+                <a:cs typeface="Times New Roman" panose="02020603050405020304" pitchFamily="18" charset="0"/>
+              </a:rPr>
+              <a:t>Scopes</a:t>
+            </a:r>
+            <a:r>
+              <a:rPr lang="en-US" dirty="0">
+                <a:latin typeface="Times New Roman" panose="02020603050405020304" pitchFamily="18" charset="0"/>
+                <a:cs typeface="Times New Roman" panose="02020603050405020304" pitchFamily="18" charset="0"/>
+              </a:rPr>
+              <a:t> a single bean definition to the lifecycle of a WebSocket. Only valid in the context of a web-aware Spring </a:t>
+            </a:r>
+            <a:r>
+              <a:rPr lang="en-US" dirty="0" err="1">
+                <a:latin typeface="Times New Roman" panose="02020603050405020304" pitchFamily="18" charset="0"/>
+                <a:cs typeface="Times New Roman" panose="02020603050405020304" pitchFamily="18" charset="0"/>
+              </a:rPr>
+              <a:t>ApplicationContex</a:t>
+            </a:r>
+            <a:endParaRPr lang="en-US" dirty="0">
+              <a:latin typeface="Times New Roman" panose="02020603050405020304" pitchFamily="18" charset="0"/>
+              <a:cs typeface="Times New Roman" panose="02020603050405020304" pitchFamily="18" charset="0"/>
+            </a:endParaRPr>
+          </a:p>
+        </p:txBody>
+      </p:sp>
+    </p:spTree>
+    <p:extLst>
+      <p:ext uri="{BB962C8B-B14F-4D97-AF65-F5344CB8AC3E}">
+        <p14:creationId xmlns:p14="http://schemas.microsoft.com/office/powerpoint/2010/main" val="3861346614"/>
+      </p:ext>
+    </p:extLst>
+  </p:cSld>
+  <p:clrMapOvr>
+    <a:masterClrMapping/>
+  </p:clrMapOvr>
+  <mc:AlternateContent xmlns:mc="http://schemas.openxmlformats.org/markup-compatibility/2006" xmlns:p14="http://schemas.microsoft.com/office/powerpoint/2010/main">
+    <mc:Choice Requires="p14">
+      <p:transition spd="med" p14:dur="700">
+        <p:fade/>
+      </p:transition>
+    </mc:Choice>
+    <mc:Fallback xmlns="">
+      <p:transition spd="med">
+        <p:fade/>
+      </p:transition>
+    </mc:Fallback>
+  </mc:AlternateContent>
+  <p:timing>
+    <p:tnLst>
+      <p:par>
+        <p:cTn id="1" dur="indefinite" restart="never" nodeType="tmRoot">
+          <p:childTnLst>
+            <p:seq concurrent="1" nextAc="seek">
+              <p:cTn id="2" dur="indefinite" nodeType="mainSeq">
+                <p:childTnLst>
+                  <p:par>
+                    <p:cTn id="3" fill="hold">
+                      <p:stCondLst>
+                        <p:cond delay="indefinite"/>
+                      </p:stCondLst>
+                      <p:childTnLst>
+                        <p:par>
+                          <p:cTn id="4" fill="hold">
+                            <p:stCondLst>
+                              <p:cond delay="0"/>
+                            </p:stCondLst>
+                            <p:childTnLst>
+                              <p:par>
+                                <p:cTn id="5" presetID="9" presetClass="entr" presetSubtype="0" fill="hold" nodeType="clickEffect">
+                                  <p:stCondLst>
+                                    <p:cond delay="0"/>
+                                  </p:stCondLst>
+                                  <p:childTnLst>
+                                    <p:set>
+                                      <p:cBhvr>
+                                        <p:cTn id="6" dur="1" fill="hold">
+                                          <p:stCondLst>
+                                            <p:cond delay="0"/>
+                                          </p:stCondLst>
+                                        </p:cTn>
+                                        <p:tgtEl>
+                                          <p:spTgt spid="3">
+                                            <p:txEl>
+                                              <p:pRg st="0" end="0"/>
+                                            </p:txEl>
+                                          </p:spTgt>
+                                        </p:tgtEl>
+                                        <p:attrNameLst>
+                                          <p:attrName>style.visibility</p:attrName>
+                                        </p:attrNameLst>
+                                      </p:cBhvr>
+                                      <p:to>
+                                        <p:strVal val="visible"/>
+                                      </p:to>
+                                    </p:set>
+                                    <p:animEffect transition="in" filter="dissolve">
+                                      <p:cBhvr>
+                                        <p:cTn id="7" dur="500"/>
+                                        <p:tgtEl>
+                                          <p:spTgt spid="3">
+                                            <p:txEl>
+                                              <p:pRg st="0" end="0"/>
+                                            </p:txEl>
+                                          </p:spTgt>
+                                        </p:tgtEl>
+                                      </p:cBhvr>
+                                    </p:animEffect>
+                                  </p:childTnLst>
+                                </p:cTn>
+                              </p:par>
+                            </p:childTnLst>
+                          </p:cTn>
+                        </p:par>
+                      </p:childTnLst>
+                    </p:cTn>
+                  </p:par>
+                  <p:par>
+                    <p:cTn id="8" fill="hold">
+                      <p:stCondLst>
+                        <p:cond delay="indefinite"/>
+                      </p:stCondLst>
+                      <p:childTnLst>
+                        <p:par>
+                          <p:cTn id="9" fill="hold">
+                            <p:stCondLst>
+                              <p:cond delay="0"/>
+                            </p:stCondLst>
+                            <p:childTnLst>
+                              <p:par>
+                                <p:cTn id="10" presetID="9" presetClass="entr" presetSubtype="0" fill="hold" nodeType="clickEffect">
+                                  <p:stCondLst>
+                                    <p:cond delay="0"/>
+                                  </p:stCondLst>
+                                  <p:childTnLst>
+                                    <p:set>
+                                      <p:cBhvr>
+                                        <p:cTn id="11" dur="1" fill="hold">
+                                          <p:stCondLst>
+                                            <p:cond delay="0"/>
+                                          </p:stCondLst>
+                                        </p:cTn>
+                                        <p:tgtEl>
+                                          <p:spTgt spid="3">
+                                            <p:txEl>
+                                              <p:pRg st="1" end="1"/>
+                                            </p:txEl>
+                                          </p:spTgt>
+                                        </p:tgtEl>
+                                        <p:attrNameLst>
+                                          <p:attrName>style.visibility</p:attrName>
+                                        </p:attrNameLst>
+                                      </p:cBhvr>
+                                      <p:to>
+                                        <p:strVal val="visible"/>
+                                      </p:to>
+                                    </p:set>
+                                    <p:animEffect transition="in" filter="dissolve">
+                                      <p:cBhvr>
+                                        <p:cTn id="12" dur="500"/>
+                                        <p:tgtEl>
+                                          <p:spTgt spid="3">
+                                            <p:txEl>
+                                              <p:pRg st="1" end="1"/>
+                                            </p:txEl>
+                                          </p:spTgt>
+                                        </p:tgtEl>
+                                      </p:cBhvr>
+                                    </p:animEffect>
+                                  </p:childTnLst>
+                                </p:cTn>
+                              </p:par>
+                            </p:childTnLst>
+                          </p:cTn>
+                        </p:par>
+                      </p:childTnLst>
+                    </p:cTn>
+                  </p:par>
+                  <p:par>
+                    <p:cTn id="13" fill="hold">
+                      <p:stCondLst>
+                        <p:cond delay="indefinite"/>
+                      </p:stCondLst>
+                      <p:childTnLst>
+                        <p:par>
+                          <p:cTn id="14" fill="hold">
+                            <p:stCondLst>
+                              <p:cond delay="0"/>
+                            </p:stCondLst>
+                            <p:childTnLst>
+                              <p:par>
+                                <p:cTn id="15" presetID="9" presetClass="entr" presetSubtype="0" fill="hold" nodeType="clickEffect">
+                                  <p:stCondLst>
+                                    <p:cond delay="0"/>
+                                  </p:stCondLst>
+                                  <p:childTnLst>
+                                    <p:set>
+                                      <p:cBhvr>
+                                        <p:cTn id="16" dur="1" fill="hold">
+                                          <p:stCondLst>
+                                            <p:cond delay="0"/>
+                                          </p:stCondLst>
+                                        </p:cTn>
+                                        <p:tgtEl>
+                                          <p:spTgt spid="3">
+                                            <p:txEl>
+                                              <p:pRg st="2" end="2"/>
+                                            </p:txEl>
+                                          </p:spTgt>
+                                        </p:tgtEl>
+                                        <p:attrNameLst>
+                                          <p:attrName>style.visibility</p:attrName>
+                                        </p:attrNameLst>
+                                      </p:cBhvr>
+                                      <p:to>
+                                        <p:strVal val="visible"/>
+                                      </p:to>
+                                    </p:set>
+                                    <p:animEffect transition="in" filter="dissolve">
+                                      <p:cBhvr>
+                                        <p:cTn id="17" dur="500"/>
+                                        <p:tgtEl>
+                                          <p:spTgt spid="3">
+                                            <p:txEl>
+                                              <p:pRg st="2" end="2"/>
+                                            </p:txEl>
+                                          </p:spTgt>
+                                        </p:tgtEl>
+                                      </p:cBhvr>
+                                    </p:animEffect>
+                                  </p:childTnLst>
+                                </p:cTn>
+                              </p:par>
+                            </p:childTnLst>
+                          </p:cTn>
+                        </p:par>
+                      </p:childTnLst>
+                    </p:cTn>
+                  </p:par>
+                  <p:par>
+                    <p:cTn id="18" fill="hold">
+                      <p:stCondLst>
+                        <p:cond delay="indefinite"/>
+                      </p:stCondLst>
+                      <p:childTnLst>
+                        <p:par>
+                          <p:cTn id="19" fill="hold">
+                            <p:stCondLst>
+                              <p:cond delay="0"/>
+                            </p:stCondLst>
+                            <p:childTnLst>
+                              <p:par>
+                                <p:cTn id="20" presetID="5" presetClass="entr" presetSubtype="10" fill="hold" nodeType="clickEffect">
+                                  <p:stCondLst>
+                                    <p:cond delay="0"/>
+                                  </p:stCondLst>
+                                  <p:childTnLst>
+                                    <p:set>
+                                      <p:cBhvr>
+                                        <p:cTn id="21" dur="1" fill="hold">
+                                          <p:stCondLst>
+                                            <p:cond delay="0"/>
+                                          </p:stCondLst>
+                                        </p:cTn>
+                                        <p:tgtEl>
+                                          <p:spTgt spid="3">
+                                            <p:txEl>
+                                              <p:pRg st="3" end="3"/>
+                                            </p:txEl>
+                                          </p:spTgt>
+                                        </p:tgtEl>
+                                        <p:attrNameLst>
+                                          <p:attrName>style.visibility</p:attrName>
+                                        </p:attrNameLst>
+                                      </p:cBhvr>
+                                      <p:to>
+                                        <p:strVal val="visible"/>
+                                      </p:to>
+                                    </p:set>
+                                    <p:animEffect transition="in" filter="checkerboard(across)">
+                                      <p:cBhvr>
+                                        <p:cTn id="22" dur="500"/>
+                                        <p:tgtEl>
+                                          <p:spTgt spid="3">
+                                            <p:txEl>
+                                              <p:pRg st="3" end="3"/>
+                                            </p:txEl>
+                                          </p:spTgt>
+                                        </p:tgtEl>
+                                      </p:cBhvr>
+                                    </p:animEffect>
+                                  </p:childTnLst>
+                                </p:cTn>
+                              </p:par>
+                            </p:childTnLst>
+                          </p:cTn>
+                        </p:par>
+                      </p:childTnLst>
+                    </p:cTn>
+                  </p:par>
+                  <p:par>
+                    <p:cTn id="23" fill="hold">
+                      <p:stCondLst>
+                        <p:cond delay="indefinite"/>
+                      </p:stCondLst>
+                      <p:childTnLst>
+                        <p:par>
+                          <p:cTn id="24" fill="hold">
+                            <p:stCondLst>
+                              <p:cond delay="0"/>
+                            </p:stCondLst>
+                            <p:childTnLst>
+                              <p:par>
+                                <p:cTn id="25" presetID="9" presetClass="entr" presetSubtype="0" fill="hold" nodeType="clickEffect">
+                                  <p:stCondLst>
+                                    <p:cond delay="0"/>
+                                  </p:stCondLst>
+                                  <p:childTnLst>
+                                    <p:set>
+                                      <p:cBhvr>
+                                        <p:cTn id="26" dur="1" fill="hold">
+                                          <p:stCondLst>
+                                            <p:cond delay="0"/>
+                                          </p:stCondLst>
+                                        </p:cTn>
+                                        <p:tgtEl>
+                                          <p:spTgt spid="3">
+                                            <p:txEl>
+                                              <p:pRg st="4" end="4"/>
+                                            </p:txEl>
+                                          </p:spTgt>
+                                        </p:tgtEl>
+                                        <p:attrNameLst>
+                                          <p:attrName>style.visibility</p:attrName>
+                                        </p:attrNameLst>
+                                      </p:cBhvr>
+                                      <p:to>
+                                        <p:strVal val="visible"/>
+                                      </p:to>
+                                    </p:set>
+                                    <p:animEffect transition="in" filter="dissolve">
+                                      <p:cBhvr>
+                                        <p:cTn id="27" dur="500"/>
+                                        <p:tgtEl>
+                                          <p:spTgt spid="3">
+                                            <p:txEl>
+                                              <p:pRg st="4" end="4"/>
+                                            </p:txEl>
+                                          </p:spTgt>
+                                        </p:tgtEl>
+                                      </p:cBhvr>
+                                    </p:animEffect>
+                                  </p:childTnLst>
+                                </p:cTn>
+                              </p:par>
+                            </p:childTnLst>
+                          </p:cTn>
+                        </p:par>
+                      </p:childTnLst>
+                    </p:cTn>
+                  </p:par>
+                  <p:par>
+                    <p:cTn id="28" fill="hold">
+                      <p:stCondLst>
+                        <p:cond delay="indefinite"/>
+                      </p:stCondLst>
+                      <p:childTnLst>
+                        <p:par>
+                          <p:cTn id="29" fill="hold">
+                            <p:stCondLst>
+                              <p:cond delay="0"/>
+                            </p:stCondLst>
+                            <p:childTnLst>
+                              <p:par>
+                                <p:cTn id="30" presetID="9" presetClass="entr" presetSubtype="0" fill="hold" nodeType="clickEffect">
+                                  <p:stCondLst>
+                                    <p:cond delay="0"/>
+                                  </p:stCondLst>
+                                  <p:childTnLst>
+                                    <p:set>
+                                      <p:cBhvr>
+                                        <p:cTn id="31" dur="1" fill="hold">
+                                          <p:stCondLst>
+                                            <p:cond delay="0"/>
+                                          </p:stCondLst>
+                                        </p:cTn>
+                                        <p:tgtEl>
+                                          <p:spTgt spid="3">
+                                            <p:txEl>
+                                              <p:pRg st="5" end="5"/>
+                                            </p:txEl>
+                                          </p:spTgt>
+                                        </p:tgtEl>
+                                        <p:attrNameLst>
+                                          <p:attrName>style.visibility</p:attrName>
+                                        </p:attrNameLst>
+                                      </p:cBhvr>
+                                      <p:to>
+                                        <p:strVal val="visible"/>
+                                      </p:to>
+                                    </p:set>
+                                    <p:animEffect transition="in" filter="dissolve">
+                                      <p:cBhvr>
+                                        <p:cTn id="32" dur="500"/>
+                                        <p:tgtEl>
+                                          <p:spTgt spid="3">
+                                            <p:txEl>
+                                              <p:pRg st="5" end="5"/>
+                                            </p:txEl>
+                                          </p:spTgt>
+                                        </p:tgtEl>
+                                      </p:cBhvr>
+                                    </p:animEffect>
+                                  </p:childTnLst>
+                                </p:cTn>
+                              </p:par>
+                            </p:childTnLst>
+                          </p:cTn>
+                        </p:par>
+                      </p:childTnLst>
+                    </p:cTn>
+                  </p:par>
+                </p:childTnLst>
+              </p:cTn>
+              <p:prevCondLst>
+                <p:cond evt="onPrev" delay="0">
+                  <p:tgtEl>
+                    <p:sldTgt/>
+                  </p:tgtEl>
+                </p:cond>
+              </p:prevCondLst>
+              <p:nextCondLst>
+                <p:cond evt="onNext" delay="0">
+                  <p:tgtEl>
+                    <p:sldTgt/>
+                  </p:tgtEl>
+                </p:cond>
+              </p:nextCondLst>
+            </p:seq>
+          </p:childTnLst>
+        </p:cTn>
+      </p:par>
+    </p:tnLst>
+  </p:timing>
+</p:sld>
+</file>
+
+<file path=ppt/slides/slide11.xml><?xml version="1.0" encoding="utf-8"?>
+<p:sld xmlns:a="http://schemas.openxmlformats.org/drawingml/2006/main" xmlns:r="http://schemas.openxmlformats.org/officeDocument/2006/relationships" xmlns:p="http://schemas.openxmlformats.org/presentationml/2006/main">
+  <p:cSld>
+    <p:bg>
+      <p:bgPr>
+        <a:blipFill dpi="0" rotWithShape="1">
+          <a:blip r:embed="rId2">
+            <a:lum/>
+          </a:blip>
+          <a:srcRect/>
+          <a:stretch>
+            <a:fillRect/>
+          </a:stretch>
+        </a:blipFill>
+        <a:effectLst/>
+      </p:bgPr>
+    </p:bg>
+    <p:spTree>
+      <p:nvGrpSpPr>
+        <p:cNvPr id="1" name=""/>
+        <p:cNvGrpSpPr/>
+        <p:nvPr/>
+      </p:nvGrpSpPr>
+      <p:grpSpPr>
+        <a:xfrm>
+          <a:off x="0" y="0"/>
+          <a:ext cx="0" cy="0"/>
+          <a:chOff x="0" y="0"/>
+          <a:chExt cx="0" cy="0"/>
+        </a:xfrm>
+      </p:grpSpPr>
+      <p:sp>
+        <p:nvSpPr>
+          <p:cNvPr id="2" name="Rectangle 1">
+            <a:extLst>
+              <a:ext uri="{FF2B5EF4-FFF2-40B4-BE49-F238E27FC236}">
+                <a16:creationId xmlns:a16="http://schemas.microsoft.com/office/drawing/2014/main" id="{48F9CE81-C1F0-B68D-8064-60FA8458DF94}"/>
+              </a:ext>
+            </a:extLst>
+          </p:cNvPr>
+          <p:cNvSpPr/>
+          <p:nvPr/>
+        </p:nvSpPr>
+        <p:spPr>
+          <a:xfrm>
+            <a:off x="1281298" y="469579"/>
+            <a:ext cx="3262433" cy="923330"/>
+          </a:xfrm>
+          <a:prstGeom prst="rect">
+            <a:avLst/>
+          </a:prstGeom>
+          <a:noFill/>
+        </p:spPr>
+        <p:txBody>
+          <a:bodyPr wrap="none" lIns="91440" tIns="45720" rIns="91440" bIns="45720">
+            <a:spAutoFit/>
+            <a:scene3d>
+              <a:camera prst="orthographicFront"/>
+              <a:lightRig rig="soft" dir="t">
+                <a:rot lat="0" lon="0" rev="15600000"/>
+              </a:lightRig>
+            </a:scene3d>
+            <a:sp3d extrusionH="57150" prstMaterial="softEdge">
+              <a:bevelT w="25400" h="38100"/>
+            </a:sp3d>
+          </a:bodyPr>
+          <a:lstStyle/>
+          <a:p>
+            <a:pPr algn="ctr"/>
+            <a:r>
+              <a:rPr lang="en-GB" sz="5400" dirty="0">
+                <a:ln w="0"/>
+                <a:gradFill>
+                  <a:gsLst>
+                    <a:gs pos="0">
+                      <a:schemeClr val="accent5">
+                        <a:lumMod val="50000"/>
+                      </a:schemeClr>
+                    </a:gs>
+                    <a:gs pos="50000">
+                      <a:schemeClr val="accent5"/>
+                    </a:gs>
+                    <a:gs pos="100000">
+                      <a:schemeClr val="accent5">
+                        <a:lumMod val="60000"/>
+                        <a:lumOff val="40000"/>
+                      </a:schemeClr>
+                    </a:gs>
+                  </a:gsLst>
+                  <a:lin ang="5400000"/>
+                </a:gradFill>
+                <a:effectLst>
+                  <a:reflection blurRad="6350" stA="53000" endA="300" endPos="35500" dir="5400000" sy="-90000" algn="bl" rotWithShape="0"/>
+                </a:effectLst>
+                <a:latin typeface="Times New Roman" panose="02020603050405020304" pitchFamily="18" charset="0"/>
+                <a:cs typeface="Times New Roman" panose="02020603050405020304" pitchFamily="18" charset="0"/>
+              </a:rPr>
+              <a:t>References</a:t>
+            </a:r>
+          </a:p>
+        </p:txBody>
+      </p:sp>
+      <p:sp>
+        <p:nvSpPr>
+          <p:cNvPr id="3" name="TextBox 2">
+            <a:extLst>
+              <a:ext uri="{FF2B5EF4-FFF2-40B4-BE49-F238E27FC236}">
+                <a16:creationId xmlns:a16="http://schemas.microsoft.com/office/drawing/2014/main" id="{E634EB09-B96B-3B94-C9B4-780CAFDCDF1C}"/>
+              </a:ext>
+            </a:extLst>
+          </p:cNvPr>
+          <p:cNvSpPr txBox="1"/>
+          <p:nvPr/>
+        </p:nvSpPr>
+        <p:spPr>
+          <a:xfrm>
+            <a:off x="906195" y="1489961"/>
+            <a:ext cx="9134763" cy="458074"/>
+          </a:xfrm>
+          <a:prstGeom prst="rect">
+            <a:avLst/>
+          </a:prstGeom>
+          <a:noFill/>
+        </p:spPr>
+        <p:txBody>
+          <a:bodyPr wrap="square" rtlCol="0">
+            <a:spAutoFit/>
+          </a:bodyPr>
+          <a:lstStyle/>
+          <a:p>
+            <a:pPr marL="285750" indent="-285750">
+              <a:lnSpc>
+                <a:spcPct val="150000"/>
+              </a:lnSpc>
+              <a:buFont typeface="Wingdings" pitchFamily="2" charset="2"/>
+              <a:buChar char="ü"/>
+            </a:pPr>
+            <a:r>
+              <a:rPr lang="en-US" b="1" dirty="0">
+                <a:latin typeface="Times New Roman" panose="02020603050405020304" pitchFamily="18" charset="0"/>
+                <a:cs typeface="Times New Roman" panose="02020603050405020304" pitchFamily="18" charset="0"/>
+              </a:rPr>
+              <a:t>https://</a:t>
+            </a:r>
+            <a:r>
+              <a:rPr lang="en-US" b="1" dirty="0" err="1">
+                <a:latin typeface="Times New Roman" panose="02020603050405020304" pitchFamily="18" charset="0"/>
+                <a:cs typeface="Times New Roman" panose="02020603050405020304" pitchFamily="18" charset="0"/>
+              </a:rPr>
+              <a:t>docs.spring.io</a:t>
+            </a:r>
+            <a:r>
+              <a:rPr lang="en-US" b="1" dirty="0">
+                <a:latin typeface="Times New Roman" panose="02020603050405020304" pitchFamily="18" charset="0"/>
+                <a:cs typeface="Times New Roman" panose="02020603050405020304" pitchFamily="18" charset="0"/>
+              </a:rPr>
+              <a:t>/spring-framework/reference/core/beans/factory-</a:t>
+            </a:r>
+            <a:r>
+              <a:rPr lang="en-US" b="1" dirty="0" err="1">
+                <a:latin typeface="Times New Roman" panose="02020603050405020304" pitchFamily="18" charset="0"/>
+                <a:cs typeface="Times New Roman" panose="02020603050405020304" pitchFamily="18" charset="0"/>
+              </a:rPr>
+              <a:t>scopes.html</a:t>
+            </a:r>
+            <a:endParaRPr lang="en-US" dirty="0">
+              <a:latin typeface="Times New Roman" panose="02020603050405020304" pitchFamily="18" charset="0"/>
+              <a:cs typeface="Times New Roman" panose="02020603050405020304" pitchFamily="18" charset="0"/>
+            </a:endParaRPr>
+          </a:p>
+        </p:txBody>
+      </p:sp>
+    </p:spTree>
+    <p:extLst>
+      <p:ext uri="{BB962C8B-B14F-4D97-AF65-F5344CB8AC3E}">
+        <p14:creationId xmlns:p14="http://schemas.microsoft.com/office/powerpoint/2010/main" val="589461595"/>
+      </p:ext>
+    </p:extLst>
+  </p:cSld>
+  <p:clrMapOvr>
+    <a:masterClrMapping/>
+  </p:clrMapOvr>
+  <mc:AlternateContent xmlns:mc="http://schemas.openxmlformats.org/markup-compatibility/2006" xmlns:p14="http://schemas.microsoft.com/office/powerpoint/2010/main">
+    <mc:Choice Requires="p14">
+      <p:transition spd="med" p14:dur="700">
+        <p:fade/>
+      </p:transition>
+    </mc:Choice>
+    <mc:Fallback xmlns="">
+      <p:transition spd="med">
+        <p:fade/>
+      </p:transition>
+    </mc:Fallback>
+  </mc:AlternateContent>
+</p:sld>
+</file>
+
+<file path=ppt/slides/slide12.xml><?xml version="1.0" encoding="utf-8"?>
+<p:sld xmlns:a="http://schemas.openxmlformats.org/drawingml/2006/main" xmlns:r="http://schemas.openxmlformats.org/officeDocument/2006/relationships" xmlns:p="http://schemas.openxmlformats.org/presentationml/2006/main">
+  <p:cSld>
+    <p:bg>
+      <p:bgPr>
+        <a:blipFill dpi="0" rotWithShape="1">
+          <a:blip r:embed="rId2">
+            <a:lum/>
+          </a:blip>
+          <a:srcRect/>
+          <a:stretch>
+            <a:fillRect/>
+          </a:stretch>
+        </a:blipFill>
+        <a:effectLst/>
+      </p:bgPr>
+    </p:bg>
+    <p:spTree>
+      <p:nvGrpSpPr>
+        <p:cNvPr id="1" name=""/>
+        <p:cNvGrpSpPr/>
+        <p:nvPr/>
+      </p:nvGrpSpPr>
+      <p:grpSpPr>
+        <a:xfrm>
+          <a:off x="0" y="0"/>
+          <a:ext cx="0" cy="0"/>
+          <a:chOff x="0" y="0"/>
+          <a:chExt cx="0" cy="0"/>
+        </a:xfrm>
+      </p:grpSpPr>
+      <p:sp>
+        <p:nvSpPr>
+          <p:cNvPr id="3" name="TextBox 2">
+            <a:extLst>
+              <a:ext uri="{FF2B5EF4-FFF2-40B4-BE49-F238E27FC236}">
+                <a16:creationId xmlns:a16="http://schemas.microsoft.com/office/drawing/2014/main" id="{E634EB09-B96B-3B94-C9B4-780CAFDCDF1C}"/>
+              </a:ext>
+            </a:extLst>
+          </p:cNvPr>
+          <p:cNvSpPr txBox="1"/>
+          <p:nvPr/>
+        </p:nvSpPr>
+        <p:spPr>
+          <a:xfrm>
+            <a:off x="906195" y="1489961"/>
+            <a:ext cx="9134763" cy="1289071"/>
+          </a:xfrm>
+          <a:prstGeom prst="rect">
+            <a:avLst/>
+          </a:prstGeom>
+          <a:noFill/>
+        </p:spPr>
+        <p:txBody>
+          <a:bodyPr wrap="square" rtlCol="0">
+            <a:spAutoFit/>
+          </a:bodyPr>
+          <a:lstStyle/>
+          <a:p>
+            <a:pPr marL="285750" indent="-285750">
+              <a:lnSpc>
+                <a:spcPct val="150000"/>
+              </a:lnSpc>
+              <a:buFont typeface="Wingdings" pitchFamily="2" charset="2"/>
+              <a:buChar char="Ø"/>
+            </a:pPr>
+            <a:r>
+              <a:rPr lang="en-US" dirty="0">
+                <a:latin typeface="Times New Roman" panose="02020603050405020304" pitchFamily="18" charset="0"/>
+                <a:cs typeface="Times New Roman" panose="02020603050405020304" pitchFamily="18" charset="0"/>
+              </a:rPr>
+              <a:t>Stages a bean goes through, from its creation to its eventual destruction. </a:t>
+            </a:r>
+          </a:p>
+          <a:p>
+            <a:pPr marL="285750" indent="-285750">
+              <a:lnSpc>
+                <a:spcPct val="150000"/>
+              </a:lnSpc>
+              <a:buFont typeface="Wingdings" pitchFamily="2" charset="2"/>
+              <a:buChar char="Ø"/>
+            </a:pPr>
+            <a:r>
+              <a:rPr lang="en-US" dirty="0">
+                <a:latin typeface="Times New Roman" panose="02020603050405020304" pitchFamily="18" charset="0"/>
+                <a:cs typeface="Times New Roman" panose="02020603050405020304" pitchFamily="18" charset="0"/>
+              </a:rPr>
+              <a:t>This lifecycle is managed by the Spring container (</a:t>
+            </a:r>
+            <a:r>
+              <a:rPr lang="en-US" dirty="0" err="1">
+                <a:latin typeface="Times New Roman" panose="02020603050405020304" pitchFamily="18" charset="0"/>
+                <a:cs typeface="Times New Roman" panose="02020603050405020304" pitchFamily="18" charset="0"/>
+              </a:rPr>
+              <a:t>BeanFactory</a:t>
+            </a:r>
+            <a:r>
+              <a:rPr lang="en-US" dirty="0">
+                <a:latin typeface="Times New Roman" panose="02020603050405020304" pitchFamily="18" charset="0"/>
+                <a:cs typeface="Times New Roman" panose="02020603050405020304" pitchFamily="18" charset="0"/>
+              </a:rPr>
+              <a:t>) to ensure beans are properly initialized, used, and cleaned up.</a:t>
+            </a:r>
+          </a:p>
+        </p:txBody>
+      </p:sp>
+      <p:sp>
+        <p:nvSpPr>
+          <p:cNvPr id="2" name="Rectangle 1">
+            <a:extLst>
+              <a:ext uri="{FF2B5EF4-FFF2-40B4-BE49-F238E27FC236}">
+                <a16:creationId xmlns:a16="http://schemas.microsoft.com/office/drawing/2014/main" id="{48F9CE81-C1F0-B68D-8064-60FA8458DF94}"/>
+              </a:ext>
+            </a:extLst>
+          </p:cNvPr>
+          <p:cNvSpPr/>
+          <p:nvPr/>
+        </p:nvSpPr>
+        <p:spPr>
+          <a:xfrm>
+            <a:off x="906195" y="566631"/>
+            <a:ext cx="4666663" cy="923330"/>
+          </a:xfrm>
+          <a:prstGeom prst="rect">
+            <a:avLst/>
+          </a:prstGeom>
+          <a:noFill/>
+        </p:spPr>
+        <p:txBody>
+          <a:bodyPr wrap="none" lIns="91440" tIns="45720" rIns="91440" bIns="45720">
+            <a:spAutoFit/>
+            <a:scene3d>
+              <a:camera prst="orthographicFront"/>
+              <a:lightRig rig="soft" dir="t">
+                <a:rot lat="0" lon="0" rev="15600000"/>
+              </a:lightRig>
+            </a:scene3d>
+            <a:sp3d extrusionH="57150" prstMaterial="softEdge">
+              <a:bevelT w="25400" h="38100"/>
+            </a:sp3d>
+          </a:bodyPr>
+          <a:lstStyle/>
+          <a:p>
+            <a:pPr algn="ctr"/>
+            <a:r>
+              <a:rPr lang="en-GB" sz="5400" dirty="0">
+                <a:ln w="0"/>
+                <a:gradFill>
+                  <a:gsLst>
+                    <a:gs pos="0">
+                      <a:schemeClr val="accent5">
+                        <a:lumMod val="50000"/>
+                      </a:schemeClr>
+                    </a:gs>
+                    <a:gs pos="50000">
+                      <a:schemeClr val="accent5"/>
+                    </a:gs>
+                    <a:gs pos="100000">
+                      <a:schemeClr val="accent5">
+                        <a:lumMod val="60000"/>
+                        <a:lumOff val="40000"/>
+                      </a:schemeClr>
+                    </a:gs>
+                  </a:gsLst>
+                  <a:lin ang="5400000"/>
+                </a:gradFill>
+                <a:effectLst>
+                  <a:reflection blurRad="6350" stA="53000" endA="300" endPos="35500" dir="5400000" sy="-90000" algn="bl" rotWithShape="0"/>
+                </a:effectLst>
+                <a:latin typeface="Times New Roman" panose="02020603050405020304" pitchFamily="18" charset="0"/>
+                <a:cs typeface="Times New Roman" panose="02020603050405020304" pitchFamily="18" charset="0"/>
+              </a:rPr>
+              <a:t>Beans Lifecycle</a:t>
+            </a:r>
+          </a:p>
+        </p:txBody>
+      </p:sp>
+      <p:pic>
+        <p:nvPicPr>
+          <p:cNvPr id="1026" name="Picture 2">
+            <a:extLst>
+              <a:ext uri="{FF2B5EF4-FFF2-40B4-BE49-F238E27FC236}">
+                <a16:creationId xmlns:a16="http://schemas.microsoft.com/office/drawing/2014/main" id="{D4636800-09E1-6D89-F619-2D027B82AF5A}"/>
+              </a:ext>
+            </a:extLst>
+          </p:cNvPr>
+          <p:cNvPicPr>
+            <a:picLocks noChangeAspect="1" noChangeArrowheads="1"/>
+          </p:cNvPicPr>
+          <p:nvPr/>
+        </p:nvPicPr>
+        <p:blipFill rotWithShape="1">
+          <a:blip r:embed="rId3">
+            <a:extLst>
+              <a:ext uri="{28A0092B-C50C-407E-A947-70E740481C1C}">
+                <a14:useLocalDpi xmlns:a14="http://schemas.microsoft.com/office/drawing/2010/main" val="0"/>
+              </a:ext>
+            </a:extLst>
+          </a:blip>
+          <a:srcRect l="3742"/>
+          <a:stretch/>
+        </p:blipFill>
+        <p:spPr bwMode="auto">
+          <a:xfrm>
+            <a:off x="1099335" y="3291695"/>
+            <a:ext cx="8304071" cy="2709375"/>
+          </a:xfrm>
+          <a:prstGeom prst="rect">
+            <a:avLst/>
+          </a:prstGeom>
+          <a:noFill/>
+          <a:extLst>
+            <a:ext uri="{909E8E84-426E-40DD-AFC4-6F175D3DCCD1}">
+              <a14:hiddenFill xmlns:a14="http://schemas.microsoft.com/office/drawing/2010/main">
+                <a:solidFill>
+                  <a:srgbClr val="FFFFFF"/>
+                </a:solidFill>
+              </a14:hiddenFill>
+            </a:ext>
+          </a:extLst>
+        </p:spPr>
+      </p:pic>
+    </p:spTree>
+    <p:extLst>
+      <p:ext uri="{BB962C8B-B14F-4D97-AF65-F5344CB8AC3E}">
+        <p14:creationId xmlns:p14="http://schemas.microsoft.com/office/powerpoint/2010/main" val="2704640334"/>
+      </p:ext>
+    </p:extLst>
+  </p:cSld>
+  <p:clrMapOvr>
+    <a:masterClrMapping/>
+  </p:clrMapOvr>
+  <mc:AlternateContent xmlns:mc="http://schemas.openxmlformats.org/markup-compatibility/2006" xmlns:p14="http://schemas.microsoft.com/office/powerpoint/2010/main">
+    <mc:Choice Requires="p14">
+      <p:transition spd="med" p14:dur="700">
+        <p:fade/>
+      </p:transition>
+    </mc:Choice>
+    <mc:Fallback xmlns="">
+      <p:transition spd="med">
+        <p:fade/>
+      </p:transition>
+    </mc:Fallback>
+  </mc:AlternateContent>
+  <p:timing>
+    <p:tnLst>
+      <p:par>
+        <p:cTn id="1" dur="indefinite" restart="never" nodeType="tmRoot">
+          <p:childTnLst>
+            <p:seq concurrent="1" nextAc="seek">
+              <p:cTn id="2" dur="indefinite" nodeType="mainSeq">
+                <p:childTnLst>
+                  <p:par>
+                    <p:cTn id="3" fill="hold">
+                      <p:stCondLst>
+                        <p:cond delay="indefinite"/>
+                      </p:stCondLst>
+                      <p:childTnLst>
+                        <p:par>
+                          <p:cTn id="4" fill="hold">
+                            <p:stCondLst>
+                              <p:cond delay="0"/>
+                            </p:stCondLst>
+                            <p:childTnLst>
+                              <p:par>
+                                <p:cTn id="5" presetID="1" presetClass="entr" presetSubtype="0" fill="hold" nodeType="clickEffect">
+                                  <p:stCondLst>
+                                    <p:cond delay="0"/>
+                                  </p:stCondLst>
+                                  <p:childTnLst>
+                                    <p:set>
+                                      <p:cBhvr>
+                                        <p:cTn id="6" dur="1" fill="hold">
+                                          <p:stCondLst>
+                                            <p:cond delay="0"/>
+                                          </p:stCondLst>
+                                        </p:cTn>
+                                        <p:tgtEl>
+                                          <p:spTgt spid="3">
+                                            <p:txEl>
+                                              <p:pRg st="0" end="0"/>
+                                            </p:txEl>
+                                          </p:spTgt>
+                                        </p:tgtEl>
+                                        <p:attrNameLst>
+                                          <p:attrName>style.visibility</p:attrName>
+                                        </p:attrNameLst>
+                                      </p:cBhvr>
+                                      <p:to>
+                                        <p:strVal val="visible"/>
+                                      </p:to>
+                                    </p:set>
+                                  </p:childTnLst>
+                                </p:cTn>
+                              </p:par>
+                            </p:childTnLst>
+                          </p:cTn>
+                        </p:par>
+                      </p:childTnLst>
+                    </p:cTn>
+                  </p:par>
+                  <p:par>
+                    <p:cTn id="7" fill="hold">
+                      <p:stCondLst>
+                        <p:cond delay="indefinite"/>
+                      </p:stCondLst>
+                      <p:childTnLst>
+                        <p:par>
+                          <p:cTn id="8" fill="hold">
+                            <p:stCondLst>
+                              <p:cond delay="0"/>
+                            </p:stCondLst>
+                            <p:childTnLst>
+                              <p:par>
+                                <p:cTn id="9" presetID="3" presetClass="entr" presetSubtype="10" fill="hold" nodeType="clickEffect">
+                                  <p:stCondLst>
+                                    <p:cond delay="0"/>
+                                  </p:stCondLst>
+                                  <p:childTnLst>
+                                    <p:set>
+                                      <p:cBhvr>
+                                        <p:cTn id="10" dur="1" fill="hold">
+                                          <p:stCondLst>
+                                            <p:cond delay="0"/>
+                                          </p:stCondLst>
+                                        </p:cTn>
+                                        <p:tgtEl>
+                                          <p:spTgt spid="3">
+                                            <p:txEl>
+                                              <p:pRg st="1" end="1"/>
+                                            </p:txEl>
+                                          </p:spTgt>
+                                        </p:tgtEl>
+                                        <p:attrNameLst>
+                                          <p:attrName>style.visibility</p:attrName>
+                                        </p:attrNameLst>
+                                      </p:cBhvr>
+                                      <p:to>
+                                        <p:strVal val="visible"/>
+                                      </p:to>
+                                    </p:set>
+                                    <p:animEffect transition="in" filter="blinds(horizontal)">
+                                      <p:cBhvr>
+                                        <p:cTn id="11" dur="500"/>
+                                        <p:tgtEl>
+                                          <p:spTgt spid="3">
+                                            <p:txEl>
+                                              <p:pRg st="1" end="1"/>
+                                            </p:txEl>
+                                          </p:spTgt>
+                                        </p:tgtEl>
+                                      </p:cBhvr>
+                                    </p:animEffect>
+                                  </p:childTnLst>
+                                </p:cTn>
+                              </p:par>
+                            </p:childTnLst>
+                          </p:cTn>
+                        </p:par>
+                      </p:childTnLst>
+                    </p:cTn>
+                  </p:par>
+                  <p:par>
+                    <p:cTn id="12" fill="hold">
+                      <p:stCondLst>
+                        <p:cond delay="indefinite"/>
+                      </p:stCondLst>
+                      <p:childTnLst>
+                        <p:par>
+                          <p:cTn id="13" fill="hold">
+                            <p:stCondLst>
+                              <p:cond delay="0"/>
+                            </p:stCondLst>
+                            <p:childTnLst>
+                              <p:par>
+                                <p:cTn id="14" presetID="9" presetClass="entr" presetSubtype="0" fill="hold" nodeType="clickEffect">
+                                  <p:stCondLst>
+                                    <p:cond delay="0"/>
+                                  </p:stCondLst>
+                                  <p:childTnLst>
+                                    <p:set>
+                                      <p:cBhvr>
+                                        <p:cTn id="15" dur="1" fill="hold">
+                                          <p:stCondLst>
+                                            <p:cond delay="0"/>
+                                          </p:stCondLst>
+                                        </p:cTn>
+                                        <p:tgtEl>
+                                          <p:spTgt spid="1026"/>
+                                        </p:tgtEl>
+                                        <p:attrNameLst>
+                                          <p:attrName>style.visibility</p:attrName>
+                                        </p:attrNameLst>
+                                      </p:cBhvr>
+                                      <p:to>
+                                        <p:strVal val="visible"/>
+                                      </p:to>
+                                    </p:set>
+                                    <p:animEffect transition="in" filter="dissolve">
+                                      <p:cBhvr>
+                                        <p:cTn id="16" dur="500"/>
+                                        <p:tgtEl>
+                                          <p:spTgt spid="1026"/>
+                                        </p:tgtEl>
+                                      </p:cBhvr>
+                                    </p:animEffect>
+                                  </p:childTnLst>
+                                </p:cTn>
+                              </p:par>
+                            </p:childTnLst>
+                          </p:cTn>
+                        </p:par>
+                      </p:childTnLst>
+                    </p:cTn>
+                  </p:par>
+                </p:childTnLst>
+              </p:cTn>
+              <p:prevCondLst>
+                <p:cond evt="onPrev" delay="0">
+                  <p:tgtEl>
+                    <p:sldTgt/>
+                  </p:tgtEl>
+                </p:cond>
+              </p:prevCondLst>
+              <p:nextCondLst>
+                <p:cond evt="onNext" delay="0">
+                  <p:tgtEl>
+                    <p:sldTgt/>
+                  </p:tgtEl>
+                </p:cond>
+              </p:nextCondLst>
+            </p:seq>
+          </p:childTnLst>
+        </p:cTn>
+      </p:par>
+    </p:tnLst>
+  </p:timing>
+</p:sld>
+</file>
+
+<file path=ppt/slides/slide13.xml><?xml version="1.0" encoding="utf-8"?>
+<p:sld xmlns:a="http://schemas.openxmlformats.org/drawingml/2006/main" xmlns:r="http://schemas.openxmlformats.org/officeDocument/2006/relationships" xmlns:p="http://schemas.openxmlformats.org/presentationml/2006/main">
+  <p:cSld>
+    <p:bg>
+      <p:bgPr>
+        <a:blipFill dpi="0" rotWithShape="1">
+          <a:blip r:embed="rId2">
+            <a:lum/>
+          </a:blip>
+          <a:srcRect/>
+          <a:stretch>
+            <a:fillRect/>
+          </a:stretch>
+        </a:blipFill>
+        <a:effectLst/>
+      </p:bgPr>
+    </p:bg>
+    <p:spTree>
+      <p:nvGrpSpPr>
+        <p:cNvPr id="1" name=""/>
+        <p:cNvGrpSpPr/>
+        <p:nvPr/>
+      </p:nvGrpSpPr>
+      <p:grpSpPr>
+        <a:xfrm>
+          <a:off x="0" y="0"/>
+          <a:ext cx="0" cy="0"/>
+          <a:chOff x="0" y="0"/>
+          <a:chExt cx="0" cy="0"/>
+        </a:xfrm>
+      </p:grpSpPr>
+      <p:sp>
+        <p:nvSpPr>
+          <p:cNvPr id="3" name="TextBox 2">
+            <a:extLst>
+              <a:ext uri="{FF2B5EF4-FFF2-40B4-BE49-F238E27FC236}">
+                <a16:creationId xmlns:a16="http://schemas.microsoft.com/office/drawing/2014/main" id="{E634EB09-B96B-3B94-C9B4-780CAFDCDF1C}"/>
+              </a:ext>
+            </a:extLst>
+          </p:cNvPr>
+          <p:cNvSpPr txBox="1"/>
+          <p:nvPr/>
+        </p:nvSpPr>
+        <p:spPr>
+          <a:xfrm>
+            <a:off x="906195" y="1489961"/>
+            <a:ext cx="9134763" cy="2126864"/>
+          </a:xfrm>
+          <a:prstGeom prst="rect">
+            <a:avLst/>
+          </a:prstGeom>
+          <a:noFill/>
+        </p:spPr>
+        <p:txBody>
+          <a:bodyPr wrap="square" rtlCol="0">
+            <a:spAutoFit/>
+          </a:bodyPr>
+          <a:lstStyle/>
+          <a:p>
+            <a:pPr marL="285750" indent="-285750">
+              <a:lnSpc>
+                <a:spcPct val="150000"/>
+              </a:lnSpc>
+              <a:buFont typeface="Wingdings" pitchFamily="2" charset="2"/>
+              <a:buChar char="Ø"/>
+            </a:pPr>
+            <a:r>
+              <a:rPr lang="en-US" dirty="0">
+                <a:latin typeface="Times New Roman" panose="02020603050405020304" pitchFamily="18" charset="0"/>
+                <a:cs typeface="Times New Roman" panose="02020603050405020304" pitchFamily="18" charset="0"/>
+              </a:rPr>
+              <a:t>Use </a:t>
+            </a:r>
+            <a:r>
+              <a:rPr lang="en-US" b="1" dirty="0" err="1">
+                <a:latin typeface="Times New Roman" panose="02020603050405020304" pitchFamily="18" charset="0"/>
+                <a:cs typeface="Times New Roman" panose="02020603050405020304" pitchFamily="18" charset="0"/>
+              </a:rPr>
+              <a:t>InitializingBean</a:t>
+            </a:r>
+            <a:r>
+              <a:rPr lang="en-US" b="1" dirty="0">
+                <a:latin typeface="Times New Roman" panose="02020603050405020304" pitchFamily="18" charset="0"/>
+                <a:cs typeface="Times New Roman" panose="02020603050405020304" pitchFamily="18" charset="0"/>
+              </a:rPr>
+              <a:t> </a:t>
+            </a:r>
+            <a:r>
+              <a:rPr lang="en-US" dirty="0">
+                <a:latin typeface="Times New Roman" panose="02020603050405020304" pitchFamily="18" charset="0"/>
+                <a:cs typeface="Times New Roman" panose="02020603050405020304" pitchFamily="18" charset="0"/>
+              </a:rPr>
+              <a:t>interface and override </a:t>
+            </a:r>
+            <a:r>
+              <a:rPr lang="en-US" b="1" dirty="0" err="1">
+                <a:latin typeface="Times New Roman" panose="02020603050405020304" pitchFamily="18" charset="0"/>
+                <a:cs typeface="Times New Roman" panose="02020603050405020304" pitchFamily="18" charset="0"/>
+              </a:rPr>
+              <a:t>afterPropertiesSet</a:t>
+            </a:r>
+            <a:r>
+              <a:rPr lang="en-US" dirty="0">
+                <a:latin typeface="Times New Roman" panose="02020603050405020304" pitchFamily="18" charset="0"/>
+                <a:cs typeface="Times New Roman" panose="02020603050405020304" pitchFamily="18" charset="0"/>
+              </a:rPr>
+              <a:t>() method for initializing purpose or use @</a:t>
+            </a:r>
+            <a:r>
+              <a:rPr lang="en-US" b="1" dirty="0" err="1">
+                <a:latin typeface="Times New Roman" panose="02020603050405020304" pitchFamily="18" charset="0"/>
+                <a:cs typeface="Times New Roman" panose="02020603050405020304" pitchFamily="18" charset="0"/>
+              </a:rPr>
+              <a:t>PostConstruct</a:t>
+            </a:r>
+            <a:r>
+              <a:rPr lang="en-US" b="1" dirty="0">
+                <a:latin typeface="Times New Roman" panose="02020603050405020304" pitchFamily="18" charset="0"/>
+                <a:cs typeface="Times New Roman" panose="02020603050405020304" pitchFamily="18" charset="0"/>
+              </a:rPr>
+              <a:t> </a:t>
+            </a:r>
+            <a:r>
+              <a:rPr lang="en-US" dirty="0">
+                <a:latin typeface="Times New Roman" panose="02020603050405020304" pitchFamily="18" charset="0"/>
+                <a:cs typeface="Times New Roman" panose="02020603050405020304" pitchFamily="18" charset="0"/>
+              </a:rPr>
+              <a:t>annotation.</a:t>
+            </a:r>
+          </a:p>
+          <a:p>
+            <a:pPr marL="285750" indent="-285750">
+              <a:lnSpc>
+                <a:spcPct val="150000"/>
+              </a:lnSpc>
+              <a:buFont typeface="Wingdings" pitchFamily="2" charset="2"/>
+              <a:buChar char="Ø"/>
+            </a:pPr>
+            <a:r>
+              <a:rPr lang="en-US" dirty="0">
+                <a:latin typeface="Times New Roman" panose="02020603050405020304" pitchFamily="18" charset="0"/>
+                <a:cs typeface="Times New Roman" panose="02020603050405020304" pitchFamily="18" charset="0"/>
+              </a:rPr>
+              <a:t>Use </a:t>
+            </a:r>
+            <a:r>
+              <a:rPr lang="en-US" b="1" dirty="0" err="1">
+                <a:latin typeface="Times New Roman" panose="02020603050405020304" pitchFamily="18" charset="0"/>
+                <a:cs typeface="Times New Roman" panose="02020603050405020304" pitchFamily="18" charset="0"/>
+              </a:rPr>
+              <a:t>DisposableBean</a:t>
+            </a:r>
+            <a:r>
+              <a:rPr lang="en-US" b="1" dirty="0">
+                <a:latin typeface="Times New Roman" panose="02020603050405020304" pitchFamily="18" charset="0"/>
+                <a:cs typeface="Times New Roman" panose="02020603050405020304" pitchFamily="18" charset="0"/>
+              </a:rPr>
+              <a:t> </a:t>
+            </a:r>
+            <a:r>
+              <a:rPr lang="en-US" dirty="0">
+                <a:latin typeface="Times New Roman" panose="02020603050405020304" pitchFamily="18" charset="0"/>
+                <a:cs typeface="Times New Roman" panose="02020603050405020304" pitchFamily="18" charset="0"/>
+              </a:rPr>
+              <a:t>interface and override </a:t>
+            </a:r>
+            <a:r>
+              <a:rPr lang="en-US" b="1" dirty="0">
+                <a:latin typeface="Times New Roman" panose="02020603050405020304" pitchFamily="18" charset="0"/>
+                <a:cs typeface="Times New Roman" panose="02020603050405020304" pitchFamily="18" charset="0"/>
+              </a:rPr>
+              <a:t>destroy </a:t>
+            </a:r>
+            <a:r>
+              <a:rPr lang="en-US" dirty="0">
+                <a:latin typeface="Times New Roman" panose="02020603050405020304" pitchFamily="18" charset="0"/>
+                <a:cs typeface="Times New Roman" panose="02020603050405020304" pitchFamily="18" charset="0"/>
+              </a:rPr>
+              <a:t>() method for initializing purpose or use @</a:t>
+            </a:r>
+            <a:r>
+              <a:rPr lang="en-US" b="1" dirty="0" err="1">
+                <a:latin typeface="Times New Roman" panose="02020603050405020304" pitchFamily="18" charset="0"/>
+                <a:cs typeface="Times New Roman" panose="02020603050405020304" pitchFamily="18" charset="0"/>
+              </a:rPr>
+              <a:t>PreDestroy</a:t>
+            </a:r>
+            <a:r>
+              <a:rPr lang="en-US" b="1" dirty="0">
+                <a:latin typeface="Times New Roman" panose="02020603050405020304" pitchFamily="18" charset="0"/>
+                <a:cs typeface="Times New Roman" panose="02020603050405020304" pitchFamily="18" charset="0"/>
+              </a:rPr>
+              <a:t> </a:t>
+            </a:r>
+            <a:r>
+              <a:rPr lang="en-US" dirty="0">
+                <a:latin typeface="Times New Roman" panose="02020603050405020304" pitchFamily="18" charset="0"/>
+                <a:cs typeface="Times New Roman" panose="02020603050405020304" pitchFamily="18" charset="0"/>
+              </a:rPr>
+              <a:t>annotation.</a:t>
+            </a:r>
+            <a:endParaRPr lang="en-IN" dirty="0">
+              <a:solidFill>
+                <a:srgbClr val="BCBEC4"/>
+              </a:solidFill>
+              <a:effectLst/>
+            </a:endParaRPr>
+          </a:p>
+          <a:p>
+            <a:pPr marL="285750" indent="-285750">
+              <a:lnSpc>
+                <a:spcPct val="150000"/>
+              </a:lnSpc>
+              <a:buFont typeface="Wingdings" pitchFamily="2" charset="2"/>
+              <a:buChar char="Ø"/>
+            </a:pPr>
+            <a:endParaRPr lang="en-IN" dirty="0">
+              <a:solidFill>
+                <a:srgbClr val="BCBEC4"/>
+              </a:solidFill>
+              <a:effectLst/>
+            </a:endParaRPr>
+          </a:p>
+        </p:txBody>
+      </p:sp>
+      <p:sp>
+        <p:nvSpPr>
+          <p:cNvPr id="2" name="Rectangle 1">
+            <a:extLst>
+              <a:ext uri="{FF2B5EF4-FFF2-40B4-BE49-F238E27FC236}">
+                <a16:creationId xmlns:a16="http://schemas.microsoft.com/office/drawing/2014/main" id="{48F9CE81-C1F0-B68D-8064-60FA8458DF94}"/>
+              </a:ext>
+            </a:extLst>
+          </p:cNvPr>
+          <p:cNvSpPr/>
+          <p:nvPr/>
+        </p:nvSpPr>
+        <p:spPr>
+          <a:xfrm>
+            <a:off x="696412" y="566631"/>
+            <a:ext cx="8456162" cy="923330"/>
+          </a:xfrm>
+          <a:prstGeom prst="rect">
+            <a:avLst/>
+          </a:prstGeom>
+          <a:noFill/>
+        </p:spPr>
+        <p:txBody>
+          <a:bodyPr wrap="none" lIns="91440" tIns="45720" rIns="91440" bIns="45720">
+            <a:spAutoFit/>
+            <a:scene3d>
+              <a:camera prst="orthographicFront"/>
+              <a:lightRig rig="soft" dir="t">
+                <a:rot lat="0" lon="0" rev="15600000"/>
+              </a:lightRig>
+            </a:scene3d>
+            <a:sp3d extrusionH="57150" prstMaterial="softEdge">
+              <a:bevelT w="25400" h="38100"/>
+            </a:sp3d>
+          </a:bodyPr>
+          <a:lstStyle/>
+          <a:p>
+            <a:pPr algn="ctr"/>
+            <a:r>
+              <a:rPr lang="en-GB" sz="5400" dirty="0">
+                <a:ln w="0"/>
+                <a:gradFill>
+                  <a:gsLst>
+                    <a:gs pos="0">
+                      <a:schemeClr val="accent5">
+                        <a:lumMod val="50000"/>
+                      </a:schemeClr>
+                    </a:gs>
+                    <a:gs pos="50000">
+                      <a:schemeClr val="accent5"/>
+                    </a:gs>
+                    <a:gs pos="100000">
+                      <a:schemeClr val="accent5">
+                        <a:lumMod val="60000"/>
+                        <a:lumOff val="40000"/>
+                      </a:schemeClr>
+                    </a:gs>
+                  </a:gsLst>
+                  <a:lin ang="5400000"/>
+                </a:gradFill>
+                <a:effectLst>
+                  <a:reflection blurRad="6350" stA="53000" endA="300" endPos="35500" dir="5400000" sy="-90000" algn="bl" rotWithShape="0"/>
+                </a:effectLst>
+                <a:latin typeface="Times New Roman" panose="02020603050405020304" pitchFamily="18" charset="0"/>
+                <a:cs typeface="Times New Roman" panose="02020603050405020304" pitchFamily="18" charset="0"/>
+              </a:rPr>
+              <a:t>Implementing Bean Lifecycle</a:t>
+            </a:r>
+          </a:p>
+        </p:txBody>
+      </p:sp>
+    </p:spTree>
+    <p:extLst>
+      <p:ext uri="{BB962C8B-B14F-4D97-AF65-F5344CB8AC3E}">
+        <p14:creationId xmlns:p14="http://schemas.microsoft.com/office/powerpoint/2010/main" val="3415519853"/>
+      </p:ext>
+    </p:extLst>
+  </p:cSld>
+  <p:clrMapOvr>
+    <a:masterClrMapping/>
+  </p:clrMapOvr>
+  <mc:AlternateContent xmlns:mc="http://schemas.openxmlformats.org/markup-compatibility/2006" xmlns:p14="http://schemas.microsoft.com/office/powerpoint/2010/main">
+    <mc:Choice Requires="p14">
+      <p:transition spd="med" p14:dur="700">
+        <p:fade/>
+      </p:transition>
+    </mc:Choice>
+    <mc:Fallback xmlns="">
+      <p:transition spd="med">
+        <p:fade/>
+      </p:transition>
+    </mc:Fallback>
+  </mc:AlternateContent>
+  <p:timing>
+    <p:tnLst>
+      <p:par>
+        <p:cTn id="1" dur="indefinite" restart="never" nodeType="tmRoot">
+          <p:childTnLst>
+            <p:seq concurrent="1" nextAc="seek">
+              <p:cTn id="2" dur="indefinite" nodeType="mainSeq">
+                <p:childTnLst>
+                  <p:par>
+                    <p:cTn id="3" fill="hold">
+                      <p:stCondLst>
+                        <p:cond delay="indefinite"/>
+                      </p:stCondLst>
+                      <p:childTnLst>
+                        <p:par>
+                          <p:cTn id="4" fill="hold">
+                            <p:stCondLst>
+                              <p:cond delay="0"/>
+                            </p:stCondLst>
+                            <p:childTnLst>
+                              <p:par>
+                                <p:cTn id="5" presetID="1" presetClass="entr" presetSubtype="0" fill="hold" nodeType="clickEffect">
+                                  <p:stCondLst>
+                                    <p:cond delay="0"/>
+                                  </p:stCondLst>
+                                  <p:childTnLst>
+                                    <p:set>
+                                      <p:cBhvr>
+                                        <p:cTn id="6" dur="1" fill="hold">
+                                          <p:stCondLst>
+                                            <p:cond delay="0"/>
+                                          </p:stCondLst>
+                                        </p:cTn>
+                                        <p:tgtEl>
+                                          <p:spTgt spid="3">
+                                            <p:txEl>
+                                              <p:pRg st="0" end="0"/>
+                                            </p:txEl>
+                                          </p:spTgt>
+                                        </p:tgtEl>
+                                        <p:attrNameLst>
+                                          <p:attrName>style.visibility</p:attrName>
+                                        </p:attrNameLst>
+                                      </p:cBhvr>
+                                      <p:to>
+                                        <p:strVal val="visible"/>
+                                      </p:to>
+                                    </p:set>
+                                  </p:childTnLst>
+                                </p:cTn>
+                              </p:par>
+                            </p:childTnLst>
+                          </p:cTn>
+                        </p:par>
+                      </p:childTnLst>
+                    </p:cTn>
+                  </p:par>
+                  <p:par>
+                    <p:cTn id="7" fill="hold">
+                      <p:stCondLst>
+                        <p:cond delay="indefinite"/>
+                      </p:stCondLst>
+                      <p:childTnLst>
+                        <p:par>
+                          <p:cTn id="8" fill="hold">
+                            <p:stCondLst>
+                              <p:cond delay="0"/>
+                            </p:stCondLst>
+                            <p:childTnLst>
+                              <p:par>
+                                <p:cTn id="9" presetID="1" presetClass="entr" presetSubtype="0" fill="hold" nodeType="clickEffect">
+                                  <p:stCondLst>
+                                    <p:cond delay="0"/>
+                                  </p:stCondLst>
+                                  <p:childTnLst>
+                                    <p:set>
+                                      <p:cBhvr>
+                                        <p:cTn id="10" dur="1" fill="hold">
+                                          <p:stCondLst>
+                                            <p:cond delay="0"/>
+                                          </p:stCondLst>
+                                        </p:cTn>
+                                        <p:tgtEl>
+                                          <p:spTgt spid="3">
+                                            <p:txEl>
+                                              <p:pRg st="1" end="1"/>
+                                            </p:txEl>
+                                          </p:spTgt>
+                                        </p:tgtEl>
+                                        <p:attrNameLst>
+                                          <p:attrName>style.visibility</p:attrName>
+                                        </p:attrNameLst>
+                                      </p:cBhvr>
+                                      <p:to>
+                                        <p:strVal val="visible"/>
+                                      </p:to>
+                                    </p:set>
+                                  </p:childTnLst>
+                                </p:cTn>
+                              </p:par>
+                            </p:childTnLst>
+                          </p:cTn>
+                        </p:par>
+                      </p:childTnLst>
+                    </p:cTn>
+                  </p:par>
+                </p:childTnLst>
+              </p:cTn>
+              <p:prevCondLst>
+                <p:cond evt="onPrev" delay="0">
+                  <p:tgtEl>
+                    <p:sldTgt/>
+                  </p:tgtEl>
+                </p:cond>
+              </p:prevCondLst>
+              <p:nextCondLst>
+                <p:cond evt="onNext" delay="0">
+                  <p:tgtEl>
+                    <p:sldTgt/>
+                  </p:tgtEl>
+                </p:cond>
+              </p:nextCondLst>
+            </p:seq>
+          </p:childTnLst>
+        </p:cTn>
+      </p:par>
+    </p:tnLst>
+  </p:timing>
 </p:sld>
 </file>
 
@@ -3603,6 +5503,18 @@
   <p:clrMapOvr>
     <a:masterClrMapping/>
   </p:clrMapOvr>
+  <mc:AlternateContent xmlns:mc="http://schemas.openxmlformats.org/markup-compatibility/2006" xmlns:p14="http://schemas.microsoft.com/office/powerpoint/2010/main">
+    <mc:Choice Requires="p14">
+      <p:transition spd="med" p14:dur="700">
+        <p:fade/>
+      </p:transition>
+    </mc:Choice>
+    <mc:Fallback xmlns="">
+      <p:transition spd="med">
+        <p:fade/>
+      </p:transition>
+    </mc:Fallback>
+  </mc:AlternateContent>
 </p:sld>
 </file>
 
@@ -3805,6 +5717,18 @@
   <p:clrMapOvr>
     <a:masterClrMapping/>
   </p:clrMapOvr>
+  <mc:AlternateContent xmlns:mc="http://schemas.openxmlformats.org/markup-compatibility/2006" xmlns:p14="http://schemas.microsoft.com/office/powerpoint/2010/main">
+    <mc:Choice Requires="p14">
+      <p:transition spd="med" p14:dur="700">
+        <p:fade/>
+      </p:transition>
+    </mc:Choice>
+    <mc:Fallback xmlns="">
+      <p:transition spd="med">
+        <p:fade/>
+      </p:transition>
+    </mc:Fallback>
+  </mc:AlternateContent>
 </p:sld>
 </file>
 
@@ -4055,6 +5979,18 @@
   <p:clrMapOvr>
     <a:masterClrMapping/>
   </p:clrMapOvr>
+  <mc:AlternateContent xmlns:mc="http://schemas.openxmlformats.org/markup-compatibility/2006" xmlns:p14="http://schemas.microsoft.com/office/powerpoint/2010/main">
+    <mc:Choice Requires="p14">
+      <p:transition spd="med" p14:dur="700">
+        <p:fade/>
+      </p:transition>
+    </mc:Choice>
+    <mc:Fallback xmlns="">
+      <p:transition spd="med">
+        <p:fade/>
+      </p:transition>
+    </mc:Fallback>
+  </mc:AlternateContent>
 </p:sld>
 </file>
 
@@ -4217,6 +6153,18 @@
   <p:clrMapOvr>
     <a:masterClrMapping/>
   </p:clrMapOvr>
+  <mc:AlternateContent xmlns:mc="http://schemas.openxmlformats.org/markup-compatibility/2006" xmlns:p14="http://schemas.microsoft.com/office/powerpoint/2010/main">
+    <mc:Choice Requires="p14">
+      <p:transition spd="med" p14:dur="700">
+        <p:fade/>
+      </p:transition>
+    </mc:Choice>
+    <mc:Fallback xmlns="">
+      <p:transition spd="med">
+        <p:fade/>
+      </p:transition>
+    </mc:Fallback>
+  </mc:AlternateContent>
 </p:sld>
 </file>
 
@@ -4439,6 +6387,18 @@
   <p:clrMapOvr>
     <a:masterClrMapping/>
   </p:clrMapOvr>
+  <mc:AlternateContent xmlns:mc="http://schemas.openxmlformats.org/markup-compatibility/2006" xmlns:p14="http://schemas.microsoft.com/office/powerpoint/2010/main">
+    <mc:Choice Requires="p14">
+      <p:transition spd="med" p14:dur="700">
+        <p:fade/>
+      </p:transition>
+    </mc:Choice>
+    <mc:Fallback xmlns="">
+      <p:transition spd="med">
+        <p:fade/>
+      </p:transition>
+    </mc:Fallback>
+  </mc:AlternateContent>
 </p:sld>
 </file>
 
@@ -4675,6 +6635,18 @@
   <p:clrMapOvr>
     <a:masterClrMapping/>
   </p:clrMapOvr>
+  <mc:AlternateContent xmlns:mc="http://schemas.openxmlformats.org/markup-compatibility/2006" xmlns:p14="http://schemas.microsoft.com/office/powerpoint/2010/main">
+    <mc:Choice Requires="p14">
+      <p:transition spd="med" p14:dur="700">
+        <p:fade/>
+      </p:transition>
+    </mc:Choice>
+    <mc:Fallback xmlns="">
+      <p:transition spd="med">
+        <p:fade/>
+      </p:transition>
+    </mc:Fallback>
+  </mc:AlternateContent>
 </p:sld>
 </file>
 
@@ -4723,8 +6695,8 @@
         </p:nvSpPr>
         <p:spPr>
           <a:xfrm>
-            <a:off x="906195" y="490127"/>
-            <a:ext cx="6282489" cy="923330"/>
+            <a:off x="906195" y="597278"/>
+            <a:ext cx="3550972" cy="923330"/>
           </a:xfrm>
           <a:prstGeom prst="rect">
             <a:avLst/>
@@ -4775,7 +6747,7 @@
                 <a:latin typeface="Times New Roman" panose="02020603050405020304" pitchFamily="18" charset="0"/>
                 <a:cs typeface="Times New Roman" panose="02020603050405020304" pitchFamily="18" charset="0"/>
               </a:rPr>
-              <a:t>Dependency Injection</a:t>
+              <a:t>Spring Boot</a:t>
             </a:r>
           </a:p>
         </p:txBody>
@@ -4795,7 +6767,7 @@
         <p:spPr>
           <a:xfrm>
             <a:off x="906195" y="1644073"/>
-            <a:ext cx="9134763" cy="646331"/>
+            <a:ext cx="9134763" cy="3693319"/>
           </a:xfrm>
           <a:prstGeom prst="rect">
             <a:avLst/>
@@ -4817,7 +6789,7 @@
                 <a:latin typeface="Times New Roman" panose="02020603050405020304" pitchFamily="18" charset="0"/>
                 <a:cs typeface="Times New Roman" panose="02020603050405020304" pitchFamily="18" charset="0"/>
               </a:rPr>
-              <a:t>Qualifier</a:t>
+              <a:t>Built on the top of Spring Framework.</a:t>
             </a:r>
           </a:p>
           <a:p>
@@ -4825,6 +6797,160 @@
               <a:buFont typeface="Wingdings" pitchFamily="2" charset="2"/>
               <a:buChar char="ü"/>
             </a:pPr>
+            <a:r>
+              <a:rPr lang="en-US" dirty="0">
+                <a:latin typeface="Times New Roman" panose="02020603050405020304" pitchFamily="18" charset="0"/>
+                <a:cs typeface="Times New Roman" panose="02020603050405020304" pitchFamily="18" charset="0"/>
+              </a:rPr>
+              <a:t>designed to simplify the development of Java applications.</a:t>
+            </a:r>
+          </a:p>
+          <a:p>
+            <a:pPr marL="285750" indent="-285750">
+              <a:buFont typeface="Wingdings" pitchFamily="2" charset="2"/>
+              <a:buChar char="ü"/>
+            </a:pPr>
+            <a:r>
+              <a:rPr lang="en-US" dirty="0">
+                <a:latin typeface="Times New Roman" panose="02020603050405020304" pitchFamily="18" charset="0"/>
+                <a:cs typeface="Times New Roman" panose="02020603050405020304" pitchFamily="18" charset="0"/>
+              </a:rPr>
+              <a:t>It addresses the issue of development </a:t>
+            </a:r>
+            <a:r>
+              <a:rPr lang="en-US" b="1" dirty="0">
+                <a:latin typeface="Times New Roman" panose="02020603050405020304" pitchFamily="18" charset="0"/>
+                <a:cs typeface="Times New Roman" panose="02020603050405020304" pitchFamily="18" charset="0"/>
+              </a:rPr>
+              <a:t>complexity</a:t>
+            </a:r>
+            <a:r>
+              <a:rPr lang="en-US" dirty="0">
+                <a:latin typeface="Times New Roman" panose="02020603050405020304" pitchFamily="18" charset="0"/>
+                <a:cs typeface="Times New Roman" panose="02020603050405020304" pitchFamily="18" charset="0"/>
+              </a:rPr>
+              <a:t> and </a:t>
+            </a:r>
+            <a:r>
+              <a:rPr lang="en-US" b="1" dirty="0">
+                <a:latin typeface="Times New Roman" panose="02020603050405020304" pitchFamily="18" charset="0"/>
+                <a:cs typeface="Times New Roman" panose="02020603050405020304" pitchFamily="18" charset="0"/>
+              </a:rPr>
+              <a:t>boilerplate code </a:t>
+            </a:r>
+            <a:r>
+              <a:rPr lang="en-US" dirty="0">
+                <a:latin typeface="Times New Roman" panose="02020603050405020304" pitchFamily="18" charset="0"/>
+                <a:cs typeface="Times New Roman" panose="02020603050405020304" pitchFamily="18" charset="0"/>
+              </a:rPr>
+              <a:t>that can be a hurdle in traditional Spring development.</a:t>
+            </a:r>
+          </a:p>
+          <a:p>
+            <a:pPr marL="285750" indent="-285750">
+              <a:buFont typeface="Wingdings" pitchFamily="2" charset="2"/>
+              <a:buChar char="ü"/>
+            </a:pPr>
+            <a:r>
+              <a:rPr lang="en-US" dirty="0">
+                <a:latin typeface="Times New Roman" panose="02020603050405020304" pitchFamily="18" charset="0"/>
+                <a:cs typeface="Times New Roman" panose="02020603050405020304" pitchFamily="18" charset="0"/>
+              </a:rPr>
+              <a:t>Reduced Boilerplate:</a:t>
+            </a:r>
+          </a:p>
+          <a:p>
+            <a:pPr marL="742950" lvl="1" indent="-285750">
+              <a:buFont typeface="Wingdings" pitchFamily="2" charset="2"/>
+              <a:buChar char="ü"/>
+            </a:pPr>
+            <a:r>
+              <a:rPr lang="en-US" dirty="0">
+                <a:latin typeface="Times New Roman" panose="02020603050405020304" pitchFamily="18" charset="0"/>
+                <a:cs typeface="Times New Roman" panose="02020603050405020304" pitchFamily="18" charset="0"/>
+              </a:rPr>
+              <a:t>Autoconfiguration</a:t>
+            </a:r>
+          </a:p>
+          <a:p>
+            <a:pPr marL="742950" lvl="1" indent="-285750">
+              <a:buFont typeface="Wingdings" pitchFamily="2" charset="2"/>
+              <a:buChar char="ü"/>
+            </a:pPr>
+            <a:r>
+              <a:rPr lang="en-US" dirty="0">
+                <a:latin typeface="Times New Roman" panose="02020603050405020304" pitchFamily="18" charset="0"/>
+                <a:cs typeface="Times New Roman" panose="02020603050405020304" pitchFamily="18" charset="0"/>
+              </a:rPr>
+              <a:t>Automatic Dependency Management</a:t>
+            </a:r>
+          </a:p>
+          <a:p>
+            <a:pPr marL="742950" lvl="1" indent="-285750">
+              <a:buFont typeface="Wingdings" pitchFamily="2" charset="2"/>
+              <a:buChar char="ü"/>
+            </a:pPr>
+            <a:r>
+              <a:rPr lang="en-US" dirty="0">
+                <a:latin typeface="Times New Roman" panose="02020603050405020304" pitchFamily="18" charset="0"/>
+                <a:cs typeface="Times New Roman" panose="02020603050405020304" pitchFamily="18" charset="0"/>
+              </a:rPr>
+              <a:t>Server Integration</a:t>
+            </a:r>
+          </a:p>
+          <a:p>
+            <a:pPr marL="285750" indent="-285750">
+              <a:buFont typeface="Wingdings" pitchFamily="2" charset="2"/>
+              <a:buChar char="ü"/>
+            </a:pPr>
+            <a:r>
+              <a:rPr lang="en-US" dirty="0">
+                <a:latin typeface="Times New Roman" panose="02020603050405020304" pitchFamily="18" charset="0"/>
+                <a:cs typeface="Times New Roman" panose="02020603050405020304" pitchFamily="18" charset="0"/>
+              </a:rPr>
+              <a:t>Faster Development(RAD)</a:t>
+            </a:r>
+          </a:p>
+          <a:p>
+            <a:pPr marL="285750" indent="-285750">
+              <a:buFont typeface="Wingdings" pitchFamily="2" charset="2"/>
+              <a:buChar char="ü"/>
+            </a:pPr>
+            <a:r>
+              <a:rPr lang="en-US" dirty="0">
+                <a:latin typeface="Times New Roman" panose="02020603050405020304" pitchFamily="18" charset="0"/>
+                <a:cs typeface="Times New Roman" panose="02020603050405020304" pitchFamily="18" charset="0"/>
+              </a:rPr>
+              <a:t>Improved Developer Experience</a:t>
+            </a:r>
+          </a:p>
+          <a:p>
+            <a:pPr marL="285750" indent="-285750">
+              <a:buFont typeface="Wingdings" pitchFamily="2" charset="2"/>
+              <a:buChar char="ü"/>
+            </a:pPr>
+            <a:r>
+              <a:rPr lang="en-US" dirty="0">
+                <a:latin typeface="Times New Roman" panose="02020603050405020304" pitchFamily="18" charset="0"/>
+                <a:cs typeface="Times New Roman" panose="02020603050405020304" pitchFamily="18" charset="0"/>
+              </a:rPr>
+              <a:t>Simplified Production Deployment:</a:t>
+            </a:r>
+          </a:p>
+          <a:p>
+            <a:pPr marL="285750" indent="-285750">
+              <a:buFont typeface="Wingdings" pitchFamily="2" charset="2"/>
+              <a:buChar char="ü"/>
+            </a:pPr>
+            <a:r>
+              <a:rPr lang="en-US" dirty="0">
+                <a:latin typeface="Times New Roman" panose="02020603050405020304" pitchFamily="18" charset="0"/>
+                <a:cs typeface="Times New Roman" panose="02020603050405020304" pitchFamily="18" charset="0"/>
+              </a:rPr>
+              <a:t>Etc.</a:t>
+            </a:r>
+          </a:p>
+          <a:p>
             <a:endParaRPr lang="en-US" dirty="0">
               <a:latin typeface="Times New Roman" panose="02020603050405020304" pitchFamily="18" charset="0"/>
               <a:cs typeface="Times New Roman" panose="02020603050405020304" pitchFamily="18" charset="0"/>
@@ -4842,6 +6968,994 @@
   <p:clrMapOvr>
     <a:masterClrMapping/>
   </p:clrMapOvr>
+  <mc:AlternateContent xmlns:mc="http://schemas.openxmlformats.org/markup-compatibility/2006" xmlns:p14="http://schemas.microsoft.com/office/powerpoint/2010/main">
+    <mc:Choice Requires="p14">
+      <p:transition spd="med" p14:dur="700">
+        <p:fade/>
+      </p:transition>
+    </mc:Choice>
+    <mc:Fallback xmlns="">
+      <p:transition spd="med">
+        <p:fade/>
+      </p:transition>
+    </mc:Fallback>
+  </mc:AlternateContent>
+  <p:timing>
+    <p:tnLst>
+      <p:par>
+        <p:cTn id="1" dur="indefinite" restart="never" nodeType="tmRoot">
+          <p:childTnLst>
+            <p:seq concurrent="1" nextAc="seek">
+              <p:cTn id="2" dur="indefinite" nodeType="mainSeq">
+                <p:childTnLst>
+                  <p:par>
+                    <p:cTn id="3" fill="hold">
+                      <p:stCondLst>
+                        <p:cond delay="indefinite"/>
+                      </p:stCondLst>
+                      <p:childTnLst>
+                        <p:par>
+                          <p:cTn id="4" fill="hold">
+                            <p:stCondLst>
+                              <p:cond delay="0"/>
+                            </p:stCondLst>
+                            <p:childTnLst>
+                              <p:par>
+                                <p:cTn id="5" presetID="1" presetClass="entr" presetSubtype="0" fill="hold" nodeType="clickEffect">
+                                  <p:stCondLst>
+                                    <p:cond delay="0"/>
+                                  </p:stCondLst>
+                                  <p:childTnLst>
+                                    <p:set>
+                                      <p:cBhvr>
+                                        <p:cTn id="6" dur="1" fill="hold">
+                                          <p:stCondLst>
+                                            <p:cond delay="0"/>
+                                          </p:stCondLst>
+                                        </p:cTn>
+                                        <p:tgtEl>
+                                          <p:spTgt spid="3">
+                                            <p:txEl>
+                                              <p:pRg st="0" end="0"/>
+                                            </p:txEl>
+                                          </p:spTgt>
+                                        </p:tgtEl>
+                                        <p:attrNameLst>
+                                          <p:attrName>style.visibility</p:attrName>
+                                        </p:attrNameLst>
+                                      </p:cBhvr>
+                                      <p:to>
+                                        <p:strVal val="visible"/>
+                                      </p:to>
+                                    </p:set>
+                                  </p:childTnLst>
+                                </p:cTn>
+                              </p:par>
+                            </p:childTnLst>
+                          </p:cTn>
+                        </p:par>
+                      </p:childTnLst>
+                    </p:cTn>
+                  </p:par>
+                  <p:par>
+                    <p:cTn id="7" fill="hold">
+                      <p:stCondLst>
+                        <p:cond delay="indefinite"/>
+                      </p:stCondLst>
+                      <p:childTnLst>
+                        <p:par>
+                          <p:cTn id="8" fill="hold">
+                            <p:stCondLst>
+                              <p:cond delay="0"/>
+                            </p:stCondLst>
+                            <p:childTnLst>
+                              <p:par>
+                                <p:cTn id="9" presetID="1" presetClass="entr" presetSubtype="0" fill="hold" nodeType="clickEffect">
+                                  <p:stCondLst>
+                                    <p:cond delay="0"/>
+                                  </p:stCondLst>
+                                  <p:childTnLst>
+                                    <p:set>
+                                      <p:cBhvr>
+                                        <p:cTn id="10" dur="1" fill="hold">
+                                          <p:stCondLst>
+                                            <p:cond delay="0"/>
+                                          </p:stCondLst>
+                                        </p:cTn>
+                                        <p:tgtEl>
+                                          <p:spTgt spid="3">
+                                            <p:txEl>
+                                              <p:pRg st="1" end="1"/>
+                                            </p:txEl>
+                                          </p:spTgt>
+                                        </p:tgtEl>
+                                        <p:attrNameLst>
+                                          <p:attrName>style.visibility</p:attrName>
+                                        </p:attrNameLst>
+                                      </p:cBhvr>
+                                      <p:to>
+                                        <p:strVal val="visible"/>
+                                      </p:to>
+                                    </p:set>
+                                  </p:childTnLst>
+                                </p:cTn>
+                              </p:par>
+                            </p:childTnLst>
+                          </p:cTn>
+                        </p:par>
+                      </p:childTnLst>
+                    </p:cTn>
+                  </p:par>
+                  <p:par>
+                    <p:cTn id="11" fill="hold">
+                      <p:stCondLst>
+                        <p:cond delay="indefinite"/>
+                      </p:stCondLst>
+                      <p:childTnLst>
+                        <p:par>
+                          <p:cTn id="12" fill="hold">
+                            <p:stCondLst>
+                              <p:cond delay="0"/>
+                            </p:stCondLst>
+                            <p:childTnLst>
+                              <p:par>
+                                <p:cTn id="13" presetID="1" presetClass="entr" presetSubtype="0" fill="hold" nodeType="clickEffect">
+                                  <p:stCondLst>
+                                    <p:cond delay="0"/>
+                                  </p:stCondLst>
+                                  <p:childTnLst>
+                                    <p:set>
+                                      <p:cBhvr>
+                                        <p:cTn id="14" dur="1" fill="hold">
+                                          <p:stCondLst>
+                                            <p:cond delay="0"/>
+                                          </p:stCondLst>
+                                        </p:cTn>
+                                        <p:tgtEl>
+                                          <p:spTgt spid="3">
+                                            <p:txEl>
+                                              <p:pRg st="2" end="2"/>
+                                            </p:txEl>
+                                          </p:spTgt>
+                                        </p:tgtEl>
+                                        <p:attrNameLst>
+                                          <p:attrName>style.visibility</p:attrName>
+                                        </p:attrNameLst>
+                                      </p:cBhvr>
+                                      <p:to>
+                                        <p:strVal val="visible"/>
+                                      </p:to>
+                                    </p:set>
+                                  </p:childTnLst>
+                                </p:cTn>
+                              </p:par>
+                            </p:childTnLst>
+                          </p:cTn>
+                        </p:par>
+                      </p:childTnLst>
+                    </p:cTn>
+                  </p:par>
+                  <p:par>
+                    <p:cTn id="15" fill="hold">
+                      <p:stCondLst>
+                        <p:cond delay="indefinite"/>
+                      </p:stCondLst>
+                      <p:childTnLst>
+                        <p:par>
+                          <p:cTn id="16" fill="hold">
+                            <p:stCondLst>
+                              <p:cond delay="0"/>
+                            </p:stCondLst>
+                            <p:childTnLst>
+                              <p:par>
+                                <p:cTn id="17" presetID="1" presetClass="entr" presetSubtype="0" fill="hold" nodeType="clickEffect">
+                                  <p:stCondLst>
+                                    <p:cond delay="0"/>
+                                  </p:stCondLst>
+                                  <p:childTnLst>
+                                    <p:set>
+                                      <p:cBhvr>
+                                        <p:cTn id="18" dur="1" fill="hold">
+                                          <p:stCondLst>
+                                            <p:cond delay="0"/>
+                                          </p:stCondLst>
+                                        </p:cTn>
+                                        <p:tgtEl>
+                                          <p:spTgt spid="3">
+                                            <p:txEl>
+                                              <p:pRg st="3" end="3"/>
+                                            </p:txEl>
+                                          </p:spTgt>
+                                        </p:tgtEl>
+                                        <p:attrNameLst>
+                                          <p:attrName>style.visibility</p:attrName>
+                                        </p:attrNameLst>
+                                      </p:cBhvr>
+                                      <p:to>
+                                        <p:strVal val="visible"/>
+                                      </p:to>
+                                    </p:set>
+                                  </p:childTnLst>
+                                </p:cTn>
+                              </p:par>
+                            </p:childTnLst>
+                          </p:cTn>
+                        </p:par>
+                      </p:childTnLst>
+                    </p:cTn>
+                  </p:par>
+                  <p:par>
+                    <p:cTn id="19" fill="hold">
+                      <p:stCondLst>
+                        <p:cond delay="indefinite"/>
+                      </p:stCondLst>
+                      <p:childTnLst>
+                        <p:par>
+                          <p:cTn id="20" fill="hold">
+                            <p:stCondLst>
+                              <p:cond delay="0"/>
+                            </p:stCondLst>
+                            <p:childTnLst>
+                              <p:par>
+                                <p:cTn id="21" presetID="1" presetClass="entr" presetSubtype="0" fill="hold" nodeType="clickEffect">
+                                  <p:stCondLst>
+                                    <p:cond delay="0"/>
+                                  </p:stCondLst>
+                                  <p:childTnLst>
+                                    <p:set>
+                                      <p:cBhvr>
+                                        <p:cTn id="22" dur="1" fill="hold">
+                                          <p:stCondLst>
+                                            <p:cond delay="0"/>
+                                          </p:stCondLst>
+                                        </p:cTn>
+                                        <p:tgtEl>
+                                          <p:spTgt spid="3">
+                                            <p:txEl>
+                                              <p:pRg st="4" end="4"/>
+                                            </p:txEl>
+                                          </p:spTgt>
+                                        </p:tgtEl>
+                                        <p:attrNameLst>
+                                          <p:attrName>style.visibility</p:attrName>
+                                        </p:attrNameLst>
+                                      </p:cBhvr>
+                                      <p:to>
+                                        <p:strVal val="visible"/>
+                                      </p:to>
+                                    </p:set>
+                                  </p:childTnLst>
+                                </p:cTn>
+                              </p:par>
+                            </p:childTnLst>
+                          </p:cTn>
+                        </p:par>
+                      </p:childTnLst>
+                    </p:cTn>
+                  </p:par>
+                  <p:par>
+                    <p:cTn id="23" fill="hold">
+                      <p:stCondLst>
+                        <p:cond delay="indefinite"/>
+                      </p:stCondLst>
+                      <p:childTnLst>
+                        <p:par>
+                          <p:cTn id="24" fill="hold">
+                            <p:stCondLst>
+                              <p:cond delay="0"/>
+                            </p:stCondLst>
+                            <p:childTnLst>
+                              <p:par>
+                                <p:cTn id="25" presetID="1" presetClass="entr" presetSubtype="0" fill="hold" nodeType="clickEffect">
+                                  <p:stCondLst>
+                                    <p:cond delay="0"/>
+                                  </p:stCondLst>
+                                  <p:childTnLst>
+                                    <p:set>
+                                      <p:cBhvr>
+                                        <p:cTn id="26" dur="1" fill="hold">
+                                          <p:stCondLst>
+                                            <p:cond delay="0"/>
+                                          </p:stCondLst>
+                                        </p:cTn>
+                                        <p:tgtEl>
+                                          <p:spTgt spid="3">
+                                            <p:txEl>
+                                              <p:pRg st="5" end="5"/>
+                                            </p:txEl>
+                                          </p:spTgt>
+                                        </p:tgtEl>
+                                        <p:attrNameLst>
+                                          <p:attrName>style.visibility</p:attrName>
+                                        </p:attrNameLst>
+                                      </p:cBhvr>
+                                      <p:to>
+                                        <p:strVal val="visible"/>
+                                      </p:to>
+                                    </p:set>
+                                  </p:childTnLst>
+                                </p:cTn>
+                              </p:par>
+                            </p:childTnLst>
+                          </p:cTn>
+                        </p:par>
+                      </p:childTnLst>
+                    </p:cTn>
+                  </p:par>
+                  <p:par>
+                    <p:cTn id="27" fill="hold">
+                      <p:stCondLst>
+                        <p:cond delay="indefinite"/>
+                      </p:stCondLst>
+                      <p:childTnLst>
+                        <p:par>
+                          <p:cTn id="28" fill="hold">
+                            <p:stCondLst>
+                              <p:cond delay="0"/>
+                            </p:stCondLst>
+                            <p:childTnLst>
+                              <p:par>
+                                <p:cTn id="29" presetID="1" presetClass="entr" presetSubtype="0" fill="hold" nodeType="clickEffect">
+                                  <p:stCondLst>
+                                    <p:cond delay="0"/>
+                                  </p:stCondLst>
+                                  <p:childTnLst>
+                                    <p:set>
+                                      <p:cBhvr>
+                                        <p:cTn id="30" dur="1" fill="hold">
+                                          <p:stCondLst>
+                                            <p:cond delay="0"/>
+                                          </p:stCondLst>
+                                        </p:cTn>
+                                        <p:tgtEl>
+                                          <p:spTgt spid="3">
+                                            <p:txEl>
+                                              <p:pRg st="6" end="6"/>
+                                            </p:txEl>
+                                          </p:spTgt>
+                                        </p:tgtEl>
+                                        <p:attrNameLst>
+                                          <p:attrName>style.visibility</p:attrName>
+                                        </p:attrNameLst>
+                                      </p:cBhvr>
+                                      <p:to>
+                                        <p:strVal val="visible"/>
+                                      </p:to>
+                                    </p:set>
+                                  </p:childTnLst>
+                                </p:cTn>
+                              </p:par>
+                            </p:childTnLst>
+                          </p:cTn>
+                        </p:par>
+                      </p:childTnLst>
+                    </p:cTn>
+                  </p:par>
+                  <p:par>
+                    <p:cTn id="31" fill="hold">
+                      <p:stCondLst>
+                        <p:cond delay="indefinite"/>
+                      </p:stCondLst>
+                      <p:childTnLst>
+                        <p:par>
+                          <p:cTn id="32" fill="hold">
+                            <p:stCondLst>
+                              <p:cond delay="0"/>
+                            </p:stCondLst>
+                            <p:childTnLst>
+                              <p:par>
+                                <p:cTn id="33" presetID="1" presetClass="entr" presetSubtype="0" fill="hold" nodeType="clickEffect">
+                                  <p:stCondLst>
+                                    <p:cond delay="0"/>
+                                  </p:stCondLst>
+                                  <p:childTnLst>
+                                    <p:set>
+                                      <p:cBhvr>
+                                        <p:cTn id="34" dur="1" fill="hold">
+                                          <p:stCondLst>
+                                            <p:cond delay="0"/>
+                                          </p:stCondLst>
+                                        </p:cTn>
+                                        <p:tgtEl>
+                                          <p:spTgt spid="3">
+                                            <p:txEl>
+                                              <p:pRg st="7" end="7"/>
+                                            </p:txEl>
+                                          </p:spTgt>
+                                        </p:tgtEl>
+                                        <p:attrNameLst>
+                                          <p:attrName>style.visibility</p:attrName>
+                                        </p:attrNameLst>
+                                      </p:cBhvr>
+                                      <p:to>
+                                        <p:strVal val="visible"/>
+                                      </p:to>
+                                    </p:set>
+                                  </p:childTnLst>
+                                </p:cTn>
+                              </p:par>
+                            </p:childTnLst>
+                          </p:cTn>
+                        </p:par>
+                      </p:childTnLst>
+                    </p:cTn>
+                  </p:par>
+                  <p:par>
+                    <p:cTn id="35" fill="hold">
+                      <p:stCondLst>
+                        <p:cond delay="indefinite"/>
+                      </p:stCondLst>
+                      <p:childTnLst>
+                        <p:par>
+                          <p:cTn id="36" fill="hold">
+                            <p:stCondLst>
+                              <p:cond delay="0"/>
+                            </p:stCondLst>
+                            <p:childTnLst>
+                              <p:par>
+                                <p:cTn id="37" presetID="1" presetClass="entr" presetSubtype="0" fill="hold" nodeType="clickEffect">
+                                  <p:stCondLst>
+                                    <p:cond delay="0"/>
+                                  </p:stCondLst>
+                                  <p:childTnLst>
+                                    <p:set>
+                                      <p:cBhvr>
+                                        <p:cTn id="38" dur="1" fill="hold">
+                                          <p:stCondLst>
+                                            <p:cond delay="0"/>
+                                          </p:stCondLst>
+                                        </p:cTn>
+                                        <p:tgtEl>
+                                          <p:spTgt spid="3">
+                                            <p:txEl>
+                                              <p:pRg st="8" end="8"/>
+                                            </p:txEl>
+                                          </p:spTgt>
+                                        </p:tgtEl>
+                                        <p:attrNameLst>
+                                          <p:attrName>style.visibility</p:attrName>
+                                        </p:attrNameLst>
+                                      </p:cBhvr>
+                                      <p:to>
+                                        <p:strVal val="visible"/>
+                                      </p:to>
+                                    </p:set>
+                                  </p:childTnLst>
+                                </p:cTn>
+                              </p:par>
+                            </p:childTnLst>
+                          </p:cTn>
+                        </p:par>
+                      </p:childTnLst>
+                    </p:cTn>
+                  </p:par>
+                  <p:par>
+                    <p:cTn id="39" fill="hold">
+                      <p:stCondLst>
+                        <p:cond delay="indefinite"/>
+                      </p:stCondLst>
+                      <p:childTnLst>
+                        <p:par>
+                          <p:cTn id="40" fill="hold">
+                            <p:stCondLst>
+                              <p:cond delay="0"/>
+                            </p:stCondLst>
+                            <p:childTnLst>
+                              <p:par>
+                                <p:cTn id="41" presetID="1" presetClass="entr" presetSubtype="0" fill="hold" nodeType="clickEffect">
+                                  <p:stCondLst>
+                                    <p:cond delay="0"/>
+                                  </p:stCondLst>
+                                  <p:childTnLst>
+                                    <p:set>
+                                      <p:cBhvr>
+                                        <p:cTn id="42" dur="1" fill="hold">
+                                          <p:stCondLst>
+                                            <p:cond delay="0"/>
+                                          </p:stCondLst>
+                                        </p:cTn>
+                                        <p:tgtEl>
+                                          <p:spTgt spid="3">
+                                            <p:txEl>
+                                              <p:pRg st="9" end="9"/>
+                                            </p:txEl>
+                                          </p:spTgt>
+                                        </p:tgtEl>
+                                        <p:attrNameLst>
+                                          <p:attrName>style.visibility</p:attrName>
+                                        </p:attrNameLst>
+                                      </p:cBhvr>
+                                      <p:to>
+                                        <p:strVal val="visible"/>
+                                      </p:to>
+                                    </p:set>
+                                  </p:childTnLst>
+                                </p:cTn>
+                              </p:par>
+                              <p:par>
+                                <p:cTn id="43" presetID="1" presetClass="entr" presetSubtype="0" fill="hold" nodeType="withEffect">
+                                  <p:stCondLst>
+                                    <p:cond delay="0"/>
+                                  </p:stCondLst>
+                                  <p:childTnLst>
+                                    <p:set>
+                                      <p:cBhvr>
+                                        <p:cTn id="44" dur="1" fill="hold">
+                                          <p:stCondLst>
+                                            <p:cond delay="0"/>
+                                          </p:stCondLst>
+                                        </p:cTn>
+                                        <p:tgtEl>
+                                          <p:spTgt spid="3">
+                                            <p:txEl>
+                                              <p:pRg st="10" end="10"/>
+                                            </p:txEl>
+                                          </p:spTgt>
+                                        </p:tgtEl>
+                                        <p:attrNameLst>
+                                          <p:attrName>style.visibility</p:attrName>
+                                        </p:attrNameLst>
+                                      </p:cBhvr>
+                                      <p:to>
+                                        <p:strVal val="visible"/>
+                                      </p:to>
+                                    </p:set>
+                                  </p:childTnLst>
+                                </p:cTn>
+                              </p:par>
+                            </p:childTnLst>
+                          </p:cTn>
+                        </p:par>
+                      </p:childTnLst>
+                    </p:cTn>
+                  </p:par>
+                </p:childTnLst>
+              </p:cTn>
+              <p:prevCondLst>
+                <p:cond evt="onPrev" delay="0">
+                  <p:tgtEl>
+                    <p:sldTgt/>
+                  </p:tgtEl>
+                </p:cond>
+              </p:prevCondLst>
+              <p:nextCondLst>
+                <p:cond evt="onNext" delay="0">
+                  <p:tgtEl>
+                    <p:sldTgt/>
+                  </p:tgtEl>
+                </p:cond>
+              </p:nextCondLst>
+            </p:seq>
+          </p:childTnLst>
+        </p:cTn>
+      </p:par>
+    </p:tnLst>
+  </p:timing>
+</p:sld>
+</file>
+
+<file path=ppt/slides/slide9.xml><?xml version="1.0" encoding="utf-8"?>
+<p:sld xmlns:a="http://schemas.openxmlformats.org/drawingml/2006/main" xmlns:r="http://schemas.openxmlformats.org/officeDocument/2006/relationships" xmlns:p="http://schemas.openxmlformats.org/presentationml/2006/main">
+  <p:cSld>
+    <p:bg>
+      <p:bgPr>
+        <a:blipFill dpi="0" rotWithShape="1">
+          <a:blip r:embed="rId2">
+            <a:lum/>
+          </a:blip>
+          <a:srcRect/>
+          <a:stretch>
+            <a:fillRect/>
+          </a:stretch>
+        </a:blipFill>
+        <a:effectLst/>
+      </p:bgPr>
+    </p:bg>
+    <p:spTree>
+      <p:nvGrpSpPr>
+        <p:cNvPr id="1" name=""/>
+        <p:cNvGrpSpPr/>
+        <p:nvPr/>
+      </p:nvGrpSpPr>
+      <p:grpSpPr>
+        <a:xfrm>
+          <a:off x="0" y="0"/>
+          <a:ext cx="0" cy="0"/>
+          <a:chOff x="0" y="0"/>
+          <a:chExt cx="0" cy="0"/>
+        </a:xfrm>
+      </p:grpSpPr>
+      <p:sp>
+        <p:nvSpPr>
+          <p:cNvPr id="2" name="Rectangle 1">
+            <a:extLst>
+              <a:ext uri="{FF2B5EF4-FFF2-40B4-BE49-F238E27FC236}">
+                <a16:creationId xmlns:a16="http://schemas.microsoft.com/office/drawing/2014/main" id="{48F9CE81-C1F0-B68D-8064-60FA8458DF94}"/>
+              </a:ext>
+            </a:extLst>
+          </p:cNvPr>
+          <p:cNvSpPr/>
+          <p:nvPr/>
+        </p:nvSpPr>
+        <p:spPr>
+          <a:xfrm>
+            <a:off x="906195" y="490127"/>
+            <a:ext cx="6282489" cy="923330"/>
+          </a:xfrm>
+          <a:prstGeom prst="rect">
+            <a:avLst/>
+          </a:prstGeom>
+          <a:noFill/>
+        </p:spPr>
+        <p:txBody>
+          <a:bodyPr wrap="none" lIns="91440" tIns="45720" rIns="91440" bIns="45720">
+            <a:spAutoFit/>
+            <a:scene3d>
+              <a:camera prst="orthographicFront"/>
+              <a:lightRig rig="soft" dir="t">
+                <a:rot lat="0" lon="0" rev="15600000"/>
+              </a:lightRig>
+            </a:scene3d>
+            <a:sp3d extrusionH="57150" prstMaterial="softEdge">
+              <a:bevelT w="25400" h="38100"/>
+            </a:sp3d>
+          </a:bodyPr>
+          <a:lstStyle/>
+          <a:p>
+            <a:pPr algn="ctr"/>
+            <a:r>
+              <a:rPr lang="en-GB" sz="5400" dirty="0">
+                <a:ln w="0"/>
+                <a:gradFill>
+                  <a:gsLst>
+                    <a:gs pos="0">
+                      <a:schemeClr val="accent5">
+                        <a:lumMod val="50000"/>
+                      </a:schemeClr>
+                    </a:gs>
+                    <a:gs pos="50000">
+                      <a:schemeClr val="accent5"/>
+                    </a:gs>
+                    <a:gs pos="100000">
+                      <a:schemeClr val="accent5">
+                        <a:lumMod val="60000"/>
+                        <a:lumOff val="40000"/>
+                      </a:schemeClr>
+                    </a:gs>
+                  </a:gsLst>
+                  <a:lin ang="5400000"/>
+                </a:gradFill>
+                <a:effectLst>
+                  <a:reflection blurRad="6350" stA="53000" endA="300" endPos="35500" dir="5400000" sy="-90000" algn="bl" rotWithShape="0"/>
+                </a:effectLst>
+                <a:latin typeface="Times New Roman" panose="02020603050405020304" pitchFamily="18" charset="0"/>
+                <a:cs typeface="Times New Roman" panose="02020603050405020304" pitchFamily="18" charset="0"/>
+              </a:rPr>
+              <a:t>Dependency Injection</a:t>
+            </a:r>
+          </a:p>
+        </p:txBody>
+      </p:sp>
+      <p:sp>
+        <p:nvSpPr>
+          <p:cNvPr id="3" name="TextBox 2">
+            <a:extLst>
+              <a:ext uri="{FF2B5EF4-FFF2-40B4-BE49-F238E27FC236}">
+                <a16:creationId xmlns:a16="http://schemas.microsoft.com/office/drawing/2014/main" id="{E634EB09-B96B-3B94-C9B4-780CAFDCDF1C}"/>
+              </a:ext>
+            </a:extLst>
+          </p:cNvPr>
+          <p:cNvSpPr txBox="1"/>
+          <p:nvPr/>
+        </p:nvSpPr>
+        <p:spPr>
+          <a:xfrm>
+            <a:off x="906195" y="1644073"/>
+            <a:ext cx="9134763" cy="1477328"/>
+          </a:xfrm>
+          <a:prstGeom prst="rect">
+            <a:avLst/>
+          </a:prstGeom>
+          <a:noFill/>
+        </p:spPr>
+        <p:txBody>
+          <a:bodyPr wrap="square" rtlCol="0">
+            <a:spAutoFit/>
+          </a:bodyPr>
+          <a:lstStyle/>
+          <a:p>
+            <a:pPr marL="285750" indent="-285750">
+              <a:buFont typeface="Wingdings" pitchFamily="2" charset="2"/>
+              <a:buChar char="ü"/>
+            </a:pPr>
+            <a:r>
+              <a:rPr lang="en-US" b="1" dirty="0">
+                <a:latin typeface="Times New Roman" panose="02020603050405020304" pitchFamily="18" charset="0"/>
+                <a:cs typeface="Times New Roman" panose="02020603050405020304" pitchFamily="18" charset="0"/>
+              </a:rPr>
+              <a:t>Working with same type of beans</a:t>
+            </a:r>
+          </a:p>
+          <a:p>
+            <a:pPr marL="285750" indent="-285750">
+              <a:buFont typeface="Wingdings" pitchFamily="2" charset="2"/>
+              <a:buChar char="ü"/>
+            </a:pPr>
+            <a:r>
+              <a:rPr lang="en-US" b="1" dirty="0" err="1">
+                <a:latin typeface="Times New Roman" panose="02020603050405020304" pitchFamily="18" charset="0"/>
+                <a:cs typeface="Times New Roman" panose="02020603050405020304" pitchFamily="18" charset="0"/>
+              </a:rPr>
+              <a:t>Qualifier,@Primary</a:t>
+            </a:r>
+            <a:r>
+              <a:rPr lang="en-US" b="1" dirty="0">
+                <a:latin typeface="Times New Roman" panose="02020603050405020304" pitchFamily="18" charset="0"/>
+                <a:cs typeface="Times New Roman" panose="02020603050405020304" pitchFamily="18" charset="0"/>
+              </a:rPr>
+              <a:t>, @Scope</a:t>
+            </a:r>
+          </a:p>
+          <a:p>
+            <a:pPr marL="285750" indent="-285750">
+              <a:buFont typeface="Wingdings" pitchFamily="2" charset="2"/>
+              <a:buChar char="ü"/>
+            </a:pPr>
+            <a:r>
+              <a:rPr lang="en-US" b="1" dirty="0">
+                <a:latin typeface="Times New Roman" panose="02020603050405020304" pitchFamily="18" charset="0"/>
+                <a:cs typeface="Times New Roman" panose="02020603050405020304" pitchFamily="18" charset="0"/>
+              </a:rPr>
+              <a:t>Loose coupling  concepts</a:t>
+            </a:r>
+          </a:p>
+          <a:p>
+            <a:pPr marL="285750" indent="-285750">
+              <a:buFont typeface="Wingdings" pitchFamily="2" charset="2"/>
+              <a:buChar char="ü"/>
+            </a:pPr>
+            <a:r>
+              <a:rPr lang="en-US" b="1" dirty="0">
+                <a:latin typeface="Times New Roman" panose="02020603050405020304" pitchFamily="18" charset="0"/>
+                <a:cs typeface="Times New Roman" panose="02020603050405020304" pitchFamily="18" charset="0"/>
+              </a:rPr>
+              <a:t>@</a:t>
+            </a:r>
+            <a:r>
+              <a:rPr lang="en-US" b="1" dirty="0" err="1">
+                <a:latin typeface="Times New Roman" panose="02020603050405020304" pitchFamily="18" charset="0"/>
+                <a:cs typeface="Times New Roman" panose="02020603050405020304" pitchFamily="18" charset="0"/>
+              </a:rPr>
+              <a:t>ImportResource</a:t>
+            </a:r>
+            <a:r>
+              <a:rPr lang="en-US" b="1" dirty="0">
+                <a:latin typeface="Times New Roman" panose="02020603050405020304" pitchFamily="18" charset="0"/>
+                <a:cs typeface="Times New Roman" panose="02020603050405020304" pitchFamily="18" charset="0"/>
+              </a:rPr>
+              <a:t>("</a:t>
+            </a:r>
+            <a:r>
+              <a:rPr lang="en-US" b="1" dirty="0" err="1">
+                <a:latin typeface="Times New Roman" panose="02020603050405020304" pitchFamily="18" charset="0"/>
+                <a:cs typeface="Times New Roman" panose="02020603050405020304" pitchFamily="18" charset="0"/>
+              </a:rPr>
+              <a:t>classpath:config.xml</a:t>
+            </a:r>
+            <a:r>
+              <a:rPr lang="en-US" b="1" dirty="0">
+                <a:latin typeface="Times New Roman" panose="02020603050405020304" pitchFamily="18" charset="0"/>
+                <a:cs typeface="Times New Roman" panose="02020603050405020304" pitchFamily="18" charset="0"/>
+              </a:rPr>
+              <a:t>")</a:t>
+            </a:r>
+          </a:p>
+          <a:p>
+            <a:pPr marL="285750" indent="-285750">
+              <a:buFont typeface="Wingdings" pitchFamily="2" charset="2"/>
+              <a:buChar char="ü"/>
+            </a:pPr>
+            <a:endParaRPr lang="en-US" dirty="0">
+              <a:latin typeface="Times New Roman" panose="02020603050405020304" pitchFamily="18" charset="0"/>
+              <a:cs typeface="Times New Roman" panose="02020603050405020304" pitchFamily="18" charset="0"/>
+            </a:endParaRPr>
+          </a:p>
+        </p:txBody>
+      </p:sp>
+    </p:spTree>
+    <p:extLst>
+      <p:ext uri="{BB962C8B-B14F-4D97-AF65-F5344CB8AC3E}">
+        <p14:creationId xmlns:p14="http://schemas.microsoft.com/office/powerpoint/2010/main" val="4066829881"/>
+      </p:ext>
+    </p:extLst>
+  </p:cSld>
+  <p:clrMapOvr>
+    <a:masterClrMapping/>
+  </p:clrMapOvr>
+  <mc:AlternateContent xmlns:mc="http://schemas.openxmlformats.org/markup-compatibility/2006" xmlns:p14="http://schemas.microsoft.com/office/powerpoint/2010/main">
+    <mc:Choice Requires="p14">
+      <p:transition spd="med" p14:dur="700">
+        <p:fade/>
+      </p:transition>
+    </mc:Choice>
+    <mc:Fallback xmlns="">
+      <p:transition spd="med">
+        <p:fade/>
+      </p:transition>
+    </mc:Fallback>
+  </mc:AlternateContent>
+  <p:timing>
+    <p:tnLst>
+      <p:par>
+        <p:cTn id="1" dur="indefinite" restart="never" nodeType="tmRoot">
+          <p:childTnLst>
+            <p:seq concurrent="1" nextAc="seek">
+              <p:cTn id="2" dur="indefinite" nodeType="mainSeq">
+                <p:childTnLst>
+                  <p:par>
+                    <p:cTn id="3" fill="hold">
+                      <p:stCondLst>
+                        <p:cond delay="indefinite"/>
+                      </p:stCondLst>
+                      <p:childTnLst>
+                        <p:par>
+                          <p:cTn id="4" fill="hold">
+                            <p:stCondLst>
+                              <p:cond delay="0"/>
+                            </p:stCondLst>
+                            <p:childTnLst>
+                              <p:par>
+                                <p:cTn id="5" presetID="1" presetClass="entr" presetSubtype="0" fill="hold" nodeType="clickEffect">
+                                  <p:stCondLst>
+                                    <p:cond delay="0"/>
+                                  </p:stCondLst>
+                                  <p:childTnLst>
+                                    <p:set>
+                                      <p:cBhvr>
+                                        <p:cTn id="6" dur="1" fill="hold">
+                                          <p:stCondLst>
+                                            <p:cond delay="0"/>
+                                          </p:stCondLst>
+                                        </p:cTn>
+                                        <p:tgtEl>
+                                          <p:spTgt spid="3">
+                                            <p:txEl>
+                                              <p:pRg st="0" end="0"/>
+                                            </p:txEl>
+                                          </p:spTgt>
+                                        </p:tgtEl>
+                                        <p:attrNameLst>
+                                          <p:attrName>style.visibility</p:attrName>
+                                        </p:attrNameLst>
+                                      </p:cBhvr>
+                                      <p:to>
+                                        <p:strVal val="visible"/>
+                                      </p:to>
+                                    </p:set>
+                                  </p:childTnLst>
+                                </p:cTn>
+                              </p:par>
+                              <p:par>
+                                <p:cTn id="7" presetID="1" presetClass="entr" presetSubtype="0" fill="hold" nodeType="withEffect">
+                                  <p:stCondLst>
+                                    <p:cond delay="0"/>
+                                  </p:stCondLst>
+                                  <p:childTnLst>
+                                    <p:set>
+                                      <p:cBhvr>
+                                        <p:cTn id="8" dur="1" fill="hold">
+                                          <p:stCondLst>
+                                            <p:cond delay="0"/>
+                                          </p:stCondLst>
+                                        </p:cTn>
+                                        <p:tgtEl>
+                                          <p:spTgt spid="3">
+                                            <p:txEl>
+                                              <p:pRg st="1" end="1"/>
+                                            </p:txEl>
+                                          </p:spTgt>
+                                        </p:tgtEl>
+                                        <p:attrNameLst>
+                                          <p:attrName>style.visibility</p:attrName>
+                                        </p:attrNameLst>
+                                      </p:cBhvr>
+                                      <p:to>
+                                        <p:strVal val="visible"/>
+                                      </p:to>
+                                    </p:set>
+                                  </p:childTnLst>
+                                </p:cTn>
+                              </p:par>
+                              <p:par>
+                                <p:cTn id="9" presetID="1" presetClass="entr" presetSubtype="0" fill="hold" nodeType="withEffect">
+                                  <p:stCondLst>
+                                    <p:cond delay="0"/>
+                                  </p:stCondLst>
+                                  <p:childTnLst>
+                                    <p:set>
+                                      <p:cBhvr>
+                                        <p:cTn id="10" dur="1" fill="hold">
+                                          <p:stCondLst>
+                                            <p:cond delay="0"/>
+                                          </p:stCondLst>
+                                        </p:cTn>
+                                        <p:tgtEl>
+                                          <p:spTgt spid="3">
+                                            <p:txEl>
+                                              <p:pRg st="2" end="2"/>
+                                            </p:txEl>
+                                          </p:spTgt>
+                                        </p:tgtEl>
+                                        <p:attrNameLst>
+                                          <p:attrName>style.visibility</p:attrName>
+                                        </p:attrNameLst>
+                                      </p:cBhvr>
+                                      <p:to>
+                                        <p:strVal val="visible"/>
+                                      </p:to>
+                                    </p:set>
+                                  </p:childTnLst>
+                                </p:cTn>
+                              </p:par>
+                              <p:par>
+                                <p:cTn id="11" presetID="1" presetClass="entr" presetSubtype="0" fill="hold" nodeType="withEffect">
+                                  <p:stCondLst>
+                                    <p:cond delay="0"/>
+                                  </p:stCondLst>
+                                  <p:childTnLst>
+                                    <p:set>
+                                      <p:cBhvr>
+                                        <p:cTn id="12" dur="1" fill="hold">
+                                          <p:stCondLst>
+                                            <p:cond delay="0"/>
+                                          </p:stCondLst>
+                                        </p:cTn>
+                                        <p:tgtEl>
+                                          <p:spTgt spid="3">
+                                            <p:txEl>
+                                              <p:pRg st="3" end="3"/>
+                                            </p:txEl>
+                                          </p:spTgt>
+                                        </p:tgtEl>
+                                        <p:attrNameLst>
+                                          <p:attrName>style.visibility</p:attrName>
+                                        </p:attrNameLst>
+                                      </p:cBhvr>
+                                      <p:to>
+                                        <p:strVal val="visible"/>
+                                      </p:to>
+                                    </p:set>
+                                  </p:childTnLst>
+                                </p:cTn>
+                              </p:par>
+                            </p:childTnLst>
+                          </p:cTn>
+                        </p:par>
+                      </p:childTnLst>
+                    </p:cTn>
+                  </p:par>
+                </p:childTnLst>
+              </p:cTn>
+              <p:prevCondLst>
+                <p:cond evt="onPrev" delay="0">
+                  <p:tgtEl>
+                    <p:sldTgt/>
+                  </p:tgtEl>
+                </p:cond>
+              </p:prevCondLst>
+              <p:nextCondLst>
+                <p:cond evt="onNext" delay="0">
+                  <p:tgtEl>
+                    <p:sldTgt/>
+                  </p:tgtEl>
+                </p:cond>
+              </p:nextCondLst>
+            </p:seq>
+          </p:childTnLst>
+        </p:cTn>
+      </p:par>
+    </p:tnLst>
+  </p:timing>
 </p:sld>
 </file>
 

</xml_diff>